<commit_message>
add react learn env
</commit_message>
<xml_diff>
--- a/2024_LLM論文要約_3.pptx
+++ b/2024_LLM論文要約_3.pptx
@@ -78,16 +78,23 @@
     <p:sldId id="323" r:id="rId73"/>
     <p:sldId id="324" r:id="rId74"/>
     <p:sldId id="325" r:id="rId75"/>
+    <p:sldId id="326" r:id="rId76"/>
+    <p:sldId id="327" r:id="rId77"/>
+    <p:sldId id="328" r:id="rId78"/>
+    <p:sldId id="329" r:id="rId79"/>
+    <p:sldId id="330" r:id="rId80"/>
+    <p:sldId id="331" r:id="rId81"/>
+    <p:sldId id="332" r:id="rId82"/>
   </p:sldIdLst>
   <p:sldSz cy="5143500" cx="9144000"/>
   <p:notesSz cx="6858000" cy="9144000"/>
   <p:embeddedFontLst>
     <p:embeddedFont>
       <p:font typeface="Proxima Nova"/>
-      <p:regular r:id="rId76"/>
-      <p:bold r:id="rId77"/>
-      <p:italic r:id="rId78"/>
-      <p:boldItalic r:id="rId79"/>
+      <p:regular r:id="rId83"/>
+      <p:bold r:id="rId84"/>
+      <p:italic r:id="rId85"/>
+      <p:boldItalic r:id="rId86"/>
     </p:embeddedFont>
   </p:embeddedFontLst>
   <p:defaultTextStyle>
@@ -7416,7 +7423,7 @@
       </p:grpSpPr>
       <p:sp>
         <p:nvSpPr>
-          <p:cNvPr id="426" name="Google Shape;426;g2b3937a3876_0_15:notes"/>
+          <p:cNvPr id="426" name="Google Shape;426;g2c6f5548b53_0_0:notes"/>
           <p:cNvSpPr/>
           <p:nvPr>
             <p:ph idx="2" type="sldImg"/>
@@ -7451,7 +7458,700 @@
       </p:sp>
       <p:sp>
         <p:nvSpPr>
-          <p:cNvPr id="427" name="Google Shape;427;g2b3937a3876_0_15:notes"/>
+          <p:cNvPr id="427" name="Google Shape;427;g2c6f5548b53_0_0:notes"/>
+          <p:cNvSpPr txBox="1"/>
+          <p:nvPr>
+            <p:ph idx="1" type="body"/>
+          </p:nvPr>
+        </p:nvSpPr>
+        <p:spPr>
+          <a:xfrm>
+            <a:off x="685800" y="4343400"/>
+            <a:ext cx="5486400" cy="4114800"/>
+          </a:xfrm>
+          <a:prstGeom prst="rect">
+            <a:avLst/>
+          </a:prstGeom>
+        </p:spPr>
+        <p:txBody>
+          <a:bodyPr anchorCtr="0" anchor="t" bIns="91425" lIns="91425" spcFirstLastPara="1" rIns="91425" wrap="square" tIns="91425">
+            <a:noAutofit/>
+          </a:bodyPr>
+          <a:lstStyle/>
+          <a:p>
+            <a:pPr indent="0" lvl="0" marL="0" rtl="0" algn="l">
+              <a:spcBef>
+                <a:spcPts val="0"/>
+              </a:spcBef>
+              <a:spcAft>
+                <a:spcPts val="0"/>
+              </a:spcAft>
+              <a:buNone/>
+            </a:pPr>
+            <a:r>
+              <a:t/>
+            </a:r>
+            <a:endParaRPr/>
+          </a:p>
+        </p:txBody>
+      </p:sp>
+    </p:spTree>
+  </p:cSld>
+  <p:clrMapOvr>
+    <a:masterClrMapping/>
+  </p:clrMapOvr>
+</p:notes>
+</file>
+
+<file path=ppt/notesSlides/notesSlide71.xml><?xml version="1.0" encoding="utf-8"?>
+<p:notes xmlns:a="http://schemas.openxmlformats.org/drawingml/2006/main" xmlns:r="http://schemas.openxmlformats.org/officeDocument/2006/relationships" xmlns:mc="http://schemas.openxmlformats.org/markup-compatibility/2006" xmlns:mv="urn:schemas-microsoft-com:mac:vml" xmlns:p="http://schemas.openxmlformats.org/presentationml/2006/main" xmlns:c="http://schemas.openxmlformats.org/drawingml/2006/chart" xmlns:dgm="http://schemas.openxmlformats.org/drawingml/2006/diagram" xmlns:o="urn:schemas-microsoft-com:office:office" xmlns:v="urn:schemas-microsoft-com:vml" xmlns:pvml="urn:schemas-microsoft-com:office:powerpoint" xmlns:com="http://schemas.openxmlformats.org/drawingml/2006/compatibility" xmlns:p14="http://schemas.microsoft.com/office/powerpoint/2010/main" xmlns:p15="http://schemas.microsoft.com/office/powerpoint/2012/main" xmlns:ahyp="http://schemas.microsoft.com/office/drawing/2018/hyperlinkcolor" showMasterPhAnim="0" showMasterSp="0">
+  <p:cSld>
+    <p:spTree>
+      <p:nvGrpSpPr>
+        <p:cNvPr id="430" name="Shape 430"/>
+        <p:cNvGrpSpPr/>
+        <p:nvPr/>
+      </p:nvGrpSpPr>
+      <p:grpSpPr>
+        <a:xfrm>
+          <a:off x="0" y="0"/>
+          <a:ext cx="0" cy="0"/>
+          <a:chOff x="0" y="0"/>
+          <a:chExt cx="0" cy="0"/>
+        </a:xfrm>
+      </p:grpSpPr>
+      <p:sp>
+        <p:nvSpPr>
+          <p:cNvPr id="431" name="Google Shape;431;g2c6f5548b53_0_10:notes"/>
+          <p:cNvSpPr/>
+          <p:nvPr>
+            <p:ph idx="2" type="sldImg"/>
+          </p:nvPr>
+        </p:nvSpPr>
+        <p:spPr>
+          <a:xfrm>
+            <a:off x="381300" y="685800"/>
+            <a:ext cx="6096000" cy="3429000"/>
+          </a:xfrm>
+          <a:custGeom>
+            <a:rect b="b" l="l" r="r" t="t"/>
+            <a:pathLst>
+              <a:path extrusionOk="0" h="120000" w="120000">
+                <a:moveTo>
+                  <a:pt x="0" y="0"/>
+                </a:moveTo>
+                <a:lnTo>
+                  <a:pt x="120000" y="0"/>
+                </a:lnTo>
+                <a:lnTo>
+                  <a:pt x="120000" y="120000"/>
+                </a:lnTo>
+                <a:lnTo>
+                  <a:pt x="0" y="120000"/>
+                </a:lnTo>
+                <a:close/>
+              </a:path>
+            </a:pathLst>
+          </a:custGeom>
+        </p:spPr>
+      </p:sp>
+      <p:sp>
+        <p:nvSpPr>
+          <p:cNvPr id="432" name="Google Shape;432;g2c6f5548b53_0_10:notes"/>
+          <p:cNvSpPr txBox="1"/>
+          <p:nvPr>
+            <p:ph idx="1" type="body"/>
+          </p:nvPr>
+        </p:nvSpPr>
+        <p:spPr>
+          <a:xfrm>
+            <a:off x="685800" y="4343400"/>
+            <a:ext cx="5486400" cy="4114800"/>
+          </a:xfrm>
+          <a:prstGeom prst="rect">
+            <a:avLst/>
+          </a:prstGeom>
+        </p:spPr>
+        <p:txBody>
+          <a:bodyPr anchorCtr="0" anchor="t" bIns="91425" lIns="91425" spcFirstLastPara="1" rIns="91425" wrap="square" tIns="91425">
+            <a:noAutofit/>
+          </a:bodyPr>
+          <a:lstStyle/>
+          <a:p>
+            <a:pPr indent="0" lvl="0" marL="0" rtl="0" algn="l">
+              <a:spcBef>
+                <a:spcPts val="0"/>
+              </a:spcBef>
+              <a:spcAft>
+                <a:spcPts val="0"/>
+              </a:spcAft>
+              <a:buNone/>
+            </a:pPr>
+            <a:r>
+              <a:t/>
+            </a:r>
+            <a:endParaRPr/>
+          </a:p>
+        </p:txBody>
+      </p:sp>
+    </p:spTree>
+  </p:cSld>
+  <p:clrMapOvr>
+    <a:masterClrMapping/>
+  </p:clrMapOvr>
+</p:notes>
+</file>
+
+<file path=ppt/notesSlides/notesSlide72.xml><?xml version="1.0" encoding="utf-8"?>
+<p:notes xmlns:a="http://schemas.openxmlformats.org/drawingml/2006/main" xmlns:r="http://schemas.openxmlformats.org/officeDocument/2006/relationships" xmlns:mc="http://schemas.openxmlformats.org/markup-compatibility/2006" xmlns:mv="urn:schemas-microsoft-com:mac:vml" xmlns:p="http://schemas.openxmlformats.org/presentationml/2006/main" xmlns:c="http://schemas.openxmlformats.org/drawingml/2006/chart" xmlns:dgm="http://schemas.openxmlformats.org/drawingml/2006/diagram" xmlns:o="urn:schemas-microsoft-com:office:office" xmlns:v="urn:schemas-microsoft-com:vml" xmlns:pvml="urn:schemas-microsoft-com:office:powerpoint" xmlns:com="http://schemas.openxmlformats.org/drawingml/2006/compatibility" xmlns:p14="http://schemas.microsoft.com/office/powerpoint/2010/main" xmlns:p15="http://schemas.microsoft.com/office/powerpoint/2012/main" xmlns:ahyp="http://schemas.microsoft.com/office/drawing/2018/hyperlinkcolor" showMasterPhAnim="0" showMasterSp="0">
+  <p:cSld>
+    <p:spTree>
+      <p:nvGrpSpPr>
+        <p:cNvPr id="435" name="Shape 435"/>
+        <p:cNvGrpSpPr/>
+        <p:nvPr/>
+      </p:nvGrpSpPr>
+      <p:grpSpPr>
+        <a:xfrm>
+          <a:off x="0" y="0"/>
+          <a:ext cx="0" cy="0"/>
+          <a:chOff x="0" y="0"/>
+          <a:chExt cx="0" cy="0"/>
+        </a:xfrm>
+      </p:grpSpPr>
+      <p:sp>
+        <p:nvSpPr>
+          <p:cNvPr id="436" name="Google Shape;436;g2c6f5548b53_0_20:notes"/>
+          <p:cNvSpPr/>
+          <p:nvPr>
+            <p:ph idx="2" type="sldImg"/>
+          </p:nvPr>
+        </p:nvSpPr>
+        <p:spPr>
+          <a:xfrm>
+            <a:off x="381300" y="685800"/>
+            <a:ext cx="6096000" cy="3429000"/>
+          </a:xfrm>
+          <a:custGeom>
+            <a:rect b="b" l="l" r="r" t="t"/>
+            <a:pathLst>
+              <a:path extrusionOk="0" h="120000" w="120000">
+                <a:moveTo>
+                  <a:pt x="0" y="0"/>
+                </a:moveTo>
+                <a:lnTo>
+                  <a:pt x="120000" y="0"/>
+                </a:lnTo>
+                <a:lnTo>
+                  <a:pt x="120000" y="120000"/>
+                </a:lnTo>
+                <a:lnTo>
+                  <a:pt x="0" y="120000"/>
+                </a:lnTo>
+                <a:close/>
+              </a:path>
+            </a:pathLst>
+          </a:custGeom>
+        </p:spPr>
+      </p:sp>
+      <p:sp>
+        <p:nvSpPr>
+          <p:cNvPr id="437" name="Google Shape;437;g2c6f5548b53_0_20:notes"/>
+          <p:cNvSpPr txBox="1"/>
+          <p:nvPr>
+            <p:ph idx="1" type="body"/>
+          </p:nvPr>
+        </p:nvSpPr>
+        <p:spPr>
+          <a:xfrm>
+            <a:off x="685800" y="4343400"/>
+            <a:ext cx="5486400" cy="4114800"/>
+          </a:xfrm>
+          <a:prstGeom prst="rect">
+            <a:avLst/>
+          </a:prstGeom>
+        </p:spPr>
+        <p:txBody>
+          <a:bodyPr anchorCtr="0" anchor="t" bIns="91425" lIns="91425" spcFirstLastPara="1" rIns="91425" wrap="square" tIns="91425">
+            <a:noAutofit/>
+          </a:bodyPr>
+          <a:lstStyle/>
+          <a:p>
+            <a:pPr indent="0" lvl="0" marL="0" rtl="0" algn="l">
+              <a:spcBef>
+                <a:spcPts val="0"/>
+              </a:spcBef>
+              <a:spcAft>
+                <a:spcPts val="0"/>
+              </a:spcAft>
+              <a:buNone/>
+            </a:pPr>
+            <a:r>
+              <a:t/>
+            </a:r>
+            <a:endParaRPr/>
+          </a:p>
+        </p:txBody>
+      </p:sp>
+    </p:spTree>
+  </p:cSld>
+  <p:clrMapOvr>
+    <a:masterClrMapping/>
+  </p:clrMapOvr>
+</p:notes>
+</file>
+
+<file path=ppt/notesSlides/notesSlide73.xml><?xml version="1.0" encoding="utf-8"?>
+<p:notes xmlns:a="http://schemas.openxmlformats.org/drawingml/2006/main" xmlns:r="http://schemas.openxmlformats.org/officeDocument/2006/relationships" xmlns:mc="http://schemas.openxmlformats.org/markup-compatibility/2006" xmlns:mv="urn:schemas-microsoft-com:mac:vml" xmlns:p="http://schemas.openxmlformats.org/presentationml/2006/main" xmlns:c="http://schemas.openxmlformats.org/drawingml/2006/chart" xmlns:dgm="http://schemas.openxmlformats.org/drawingml/2006/diagram" xmlns:o="urn:schemas-microsoft-com:office:office" xmlns:v="urn:schemas-microsoft-com:vml" xmlns:pvml="urn:schemas-microsoft-com:office:powerpoint" xmlns:com="http://schemas.openxmlformats.org/drawingml/2006/compatibility" xmlns:p14="http://schemas.microsoft.com/office/powerpoint/2010/main" xmlns:p15="http://schemas.microsoft.com/office/powerpoint/2012/main" xmlns:ahyp="http://schemas.microsoft.com/office/drawing/2018/hyperlinkcolor" showMasterPhAnim="0" showMasterSp="0">
+  <p:cSld>
+    <p:spTree>
+      <p:nvGrpSpPr>
+        <p:cNvPr id="440" name="Shape 440"/>
+        <p:cNvGrpSpPr/>
+        <p:nvPr/>
+      </p:nvGrpSpPr>
+      <p:grpSpPr>
+        <a:xfrm>
+          <a:off x="0" y="0"/>
+          <a:ext cx="0" cy="0"/>
+          <a:chOff x="0" y="0"/>
+          <a:chExt cx="0" cy="0"/>
+        </a:xfrm>
+      </p:grpSpPr>
+      <p:sp>
+        <p:nvSpPr>
+          <p:cNvPr id="441" name="Google Shape;441;g2c6f5548b53_0_33:notes"/>
+          <p:cNvSpPr/>
+          <p:nvPr>
+            <p:ph idx="2" type="sldImg"/>
+          </p:nvPr>
+        </p:nvSpPr>
+        <p:spPr>
+          <a:xfrm>
+            <a:off x="381300" y="685800"/>
+            <a:ext cx="6096000" cy="3429000"/>
+          </a:xfrm>
+          <a:custGeom>
+            <a:rect b="b" l="l" r="r" t="t"/>
+            <a:pathLst>
+              <a:path extrusionOk="0" h="120000" w="120000">
+                <a:moveTo>
+                  <a:pt x="0" y="0"/>
+                </a:moveTo>
+                <a:lnTo>
+                  <a:pt x="120000" y="0"/>
+                </a:lnTo>
+                <a:lnTo>
+                  <a:pt x="120000" y="120000"/>
+                </a:lnTo>
+                <a:lnTo>
+                  <a:pt x="0" y="120000"/>
+                </a:lnTo>
+                <a:close/>
+              </a:path>
+            </a:pathLst>
+          </a:custGeom>
+        </p:spPr>
+      </p:sp>
+      <p:sp>
+        <p:nvSpPr>
+          <p:cNvPr id="442" name="Google Shape;442;g2c6f5548b53_0_33:notes"/>
+          <p:cNvSpPr txBox="1"/>
+          <p:nvPr>
+            <p:ph idx="1" type="body"/>
+          </p:nvPr>
+        </p:nvSpPr>
+        <p:spPr>
+          <a:xfrm>
+            <a:off x="685800" y="4343400"/>
+            <a:ext cx="5486400" cy="4114800"/>
+          </a:xfrm>
+          <a:prstGeom prst="rect">
+            <a:avLst/>
+          </a:prstGeom>
+        </p:spPr>
+        <p:txBody>
+          <a:bodyPr anchorCtr="0" anchor="t" bIns="91425" lIns="91425" spcFirstLastPara="1" rIns="91425" wrap="square" tIns="91425">
+            <a:noAutofit/>
+          </a:bodyPr>
+          <a:lstStyle/>
+          <a:p>
+            <a:pPr indent="0" lvl="0" marL="0" rtl="0" algn="l">
+              <a:spcBef>
+                <a:spcPts val="0"/>
+              </a:spcBef>
+              <a:spcAft>
+                <a:spcPts val="0"/>
+              </a:spcAft>
+              <a:buNone/>
+            </a:pPr>
+            <a:r>
+              <a:t/>
+            </a:r>
+            <a:endParaRPr/>
+          </a:p>
+        </p:txBody>
+      </p:sp>
+    </p:spTree>
+  </p:cSld>
+  <p:clrMapOvr>
+    <a:masterClrMapping/>
+  </p:clrMapOvr>
+</p:notes>
+</file>
+
+<file path=ppt/notesSlides/notesSlide74.xml><?xml version="1.0" encoding="utf-8"?>
+<p:notes xmlns:a="http://schemas.openxmlformats.org/drawingml/2006/main" xmlns:r="http://schemas.openxmlformats.org/officeDocument/2006/relationships" xmlns:mc="http://schemas.openxmlformats.org/markup-compatibility/2006" xmlns:mv="urn:schemas-microsoft-com:mac:vml" xmlns:p="http://schemas.openxmlformats.org/presentationml/2006/main" xmlns:c="http://schemas.openxmlformats.org/drawingml/2006/chart" xmlns:dgm="http://schemas.openxmlformats.org/drawingml/2006/diagram" xmlns:o="urn:schemas-microsoft-com:office:office" xmlns:v="urn:schemas-microsoft-com:vml" xmlns:pvml="urn:schemas-microsoft-com:office:powerpoint" xmlns:com="http://schemas.openxmlformats.org/drawingml/2006/compatibility" xmlns:p14="http://schemas.microsoft.com/office/powerpoint/2010/main" xmlns:p15="http://schemas.microsoft.com/office/powerpoint/2012/main" xmlns:ahyp="http://schemas.microsoft.com/office/drawing/2018/hyperlinkcolor" showMasterPhAnim="0" showMasterSp="0">
+  <p:cSld>
+    <p:spTree>
+      <p:nvGrpSpPr>
+        <p:cNvPr id="445" name="Shape 445"/>
+        <p:cNvGrpSpPr/>
+        <p:nvPr/>
+      </p:nvGrpSpPr>
+      <p:grpSpPr>
+        <a:xfrm>
+          <a:off x="0" y="0"/>
+          <a:ext cx="0" cy="0"/>
+          <a:chOff x="0" y="0"/>
+          <a:chExt cx="0" cy="0"/>
+        </a:xfrm>
+      </p:grpSpPr>
+      <p:sp>
+        <p:nvSpPr>
+          <p:cNvPr id="446" name="Google Shape;446;g2c6f5548b53_0_45:notes"/>
+          <p:cNvSpPr/>
+          <p:nvPr>
+            <p:ph idx="2" type="sldImg"/>
+          </p:nvPr>
+        </p:nvSpPr>
+        <p:spPr>
+          <a:xfrm>
+            <a:off x="381300" y="685800"/>
+            <a:ext cx="6096000" cy="3429000"/>
+          </a:xfrm>
+          <a:custGeom>
+            <a:rect b="b" l="l" r="r" t="t"/>
+            <a:pathLst>
+              <a:path extrusionOk="0" h="120000" w="120000">
+                <a:moveTo>
+                  <a:pt x="0" y="0"/>
+                </a:moveTo>
+                <a:lnTo>
+                  <a:pt x="120000" y="0"/>
+                </a:lnTo>
+                <a:lnTo>
+                  <a:pt x="120000" y="120000"/>
+                </a:lnTo>
+                <a:lnTo>
+                  <a:pt x="0" y="120000"/>
+                </a:lnTo>
+                <a:close/>
+              </a:path>
+            </a:pathLst>
+          </a:custGeom>
+        </p:spPr>
+      </p:sp>
+      <p:sp>
+        <p:nvSpPr>
+          <p:cNvPr id="447" name="Google Shape;447;g2c6f5548b53_0_45:notes"/>
+          <p:cNvSpPr txBox="1"/>
+          <p:nvPr>
+            <p:ph idx="1" type="body"/>
+          </p:nvPr>
+        </p:nvSpPr>
+        <p:spPr>
+          <a:xfrm>
+            <a:off x="685800" y="4343400"/>
+            <a:ext cx="5486400" cy="4114800"/>
+          </a:xfrm>
+          <a:prstGeom prst="rect">
+            <a:avLst/>
+          </a:prstGeom>
+        </p:spPr>
+        <p:txBody>
+          <a:bodyPr anchorCtr="0" anchor="t" bIns="91425" lIns="91425" spcFirstLastPara="1" rIns="91425" wrap="square" tIns="91425">
+            <a:noAutofit/>
+          </a:bodyPr>
+          <a:lstStyle/>
+          <a:p>
+            <a:pPr indent="0" lvl="0" marL="0" rtl="0" algn="l">
+              <a:spcBef>
+                <a:spcPts val="0"/>
+              </a:spcBef>
+              <a:spcAft>
+                <a:spcPts val="0"/>
+              </a:spcAft>
+              <a:buNone/>
+            </a:pPr>
+            <a:r>
+              <a:t/>
+            </a:r>
+            <a:endParaRPr/>
+          </a:p>
+        </p:txBody>
+      </p:sp>
+    </p:spTree>
+  </p:cSld>
+  <p:clrMapOvr>
+    <a:masterClrMapping/>
+  </p:clrMapOvr>
+</p:notes>
+</file>
+
+<file path=ppt/notesSlides/notesSlide75.xml><?xml version="1.0" encoding="utf-8"?>
+<p:notes xmlns:a="http://schemas.openxmlformats.org/drawingml/2006/main" xmlns:r="http://schemas.openxmlformats.org/officeDocument/2006/relationships" xmlns:mc="http://schemas.openxmlformats.org/markup-compatibility/2006" xmlns:mv="urn:schemas-microsoft-com:mac:vml" xmlns:p="http://schemas.openxmlformats.org/presentationml/2006/main" xmlns:c="http://schemas.openxmlformats.org/drawingml/2006/chart" xmlns:dgm="http://schemas.openxmlformats.org/drawingml/2006/diagram" xmlns:o="urn:schemas-microsoft-com:office:office" xmlns:v="urn:schemas-microsoft-com:vml" xmlns:pvml="urn:schemas-microsoft-com:office:powerpoint" xmlns:com="http://schemas.openxmlformats.org/drawingml/2006/compatibility" xmlns:p14="http://schemas.microsoft.com/office/powerpoint/2010/main" xmlns:p15="http://schemas.microsoft.com/office/powerpoint/2012/main" xmlns:ahyp="http://schemas.microsoft.com/office/drawing/2018/hyperlinkcolor" showMasterPhAnim="0" showMasterSp="0">
+  <p:cSld>
+    <p:spTree>
+      <p:nvGrpSpPr>
+        <p:cNvPr id="450" name="Shape 450"/>
+        <p:cNvGrpSpPr/>
+        <p:nvPr/>
+      </p:nvGrpSpPr>
+      <p:grpSpPr>
+        <a:xfrm>
+          <a:off x="0" y="0"/>
+          <a:ext cx="0" cy="0"/>
+          <a:chOff x="0" y="0"/>
+          <a:chExt cx="0" cy="0"/>
+        </a:xfrm>
+      </p:grpSpPr>
+      <p:sp>
+        <p:nvSpPr>
+          <p:cNvPr id="451" name="Google Shape;451;g2c74f300a7c_0_0:notes"/>
+          <p:cNvSpPr/>
+          <p:nvPr>
+            <p:ph idx="2" type="sldImg"/>
+          </p:nvPr>
+        </p:nvSpPr>
+        <p:spPr>
+          <a:xfrm>
+            <a:off x="381300" y="685800"/>
+            <a:ext cx="6096000" cy="3429000"/>
+          </a:xfrm>
+          <a:custGeom>
+            <a:rect b="b" l="l" r="r" t="t"/>
+            <a:pathLst>
+              <a:path extrusionOk="0" h="120000" w="120000">
+                <a:moveTo>
+                  <a:pt x="0" y="0"/>
+                </a:moveTo>
+                <a:lnTo>
+                  <a:pt x="120000" y="0"/>
+                </a:lnTo>
+                <a:lnTo>
+                  <a:pt x="120000" y="120000"/>
+                </a:lnTo>
+                <a:lnTo>
+                  <a:pt x="0" y="120000"/>
+                </a:lnTo>
+                <a:close/>
+              </a:path>
+            </a:pathLst>
+          </a:custGeom>
+        </p:spPr>
+      </p:sp>
+      <p:sp>
+        <p:nvSpPr>
+          <p:cNvPr id="452" name="Google Shape;452;g2c74f300a7c_0_0:notes"/>
+          <p:cNvSpPr txBox="1"/>
+          <p:nvPr>
+            <p:ph idx="1" type="body"/>
+          </p:nvPr>
+        </p:nvSpPr>
+        <p:spPr>
+          <a:xfrm>
+            <a:off x="685800" y="4343400"/>
+            <a:ext cx="5486400" cy="4114800"/>
+          </a:xfrm>
+          <a:prstGeom prst="rect">
+            <a:avLst/>
+          </a:prstGeom>
+        </p:spPr>
+        <p:txBody>
+          <a:bodyPr anchorCtr="0" anchor="t" bIns="91425" lIns="91425" spcFirstLastPara="1" rIns="91425" wrap="square" tIns="91425">
+            <a:noAutofit/>
+          </a:bodyPr>
+          <a:lstStyle/>
+          <a:p>
+            <a:pPr indent="0" lvl="0" marL="0" rtl="0" algn="l">
+              <a:spcBef>
+                <a:spcPts val="0"/>
+              </a:spcBef>
+              <a:spcAft>
+                <a:spcPts val="0"/>
+              </a:spcAft>
+              <a:buNone/>
+            </a:pPr>
+            <a:r>
+              <a:t/>
+            </a:r>
+            <a:endParaRPr/>
+          </a:p>
+        </p:txBody>
+      </p:sp>
+    </p:spTree>
+  </p:cSld>
+  <p:clrMapOvr>
+    <a:masterClrMapping/>
+  </p:clrMapOvr>
+</p:notes>
+</file>
+
+<file path=ppt/notesSlides/notesSlide76.xml><?xml version="1.0" encoding="utf-8"?>
+<p:notes xmlns:a="http://schemas.openxmlformats.org/drawingml/2006/main" xmlns:r="http://schemas.openxmlformats.org/officeDocument/2006/relationships" xmlns:mc="http://schemas.openxmlformats.org/markup-compatibility/2006" xmlns:mv="urn:schemas-microsoft-com:mac:vml" xmlns:p="http://schemas.openxmlformats.org/presentationml/2006/main" xmlns:c="http://schemas.openxmlformats.org/drawingml/2006/chart" xmlns:dgm="http://schemas.openxmlformats.org/drawingml/2006/diagram" xmlns:o="urn:schemas-microsoft-com:office:office" xmlns:v="urn:schemas-microsoft-com:vml" xmlns:pvml="urn:schemas-microsoft-com:office:powerpoint" xmlns:com="http://schemas.openxmlformats.org/drawingml/2006/compatibility" xmlns:p14="http://schemas.microsoft.com/office/powerpoint/2010/main" xmlns:p15="http://schemas.microsoft.com/office/powerpoint/2012/main" xmlns:ahyp="http://schemas.microsoft.com/office/drawing/2018/hyperlinkcolor" showMasterPhAnim="0" showMasterSp="0">
+  <p:cSld>
+    <p:spTree>
+      <p:nvGrpSpPr>
+        <p:cNvPr id="455" name="Shape 455"/>
+        <p:cNvGrpSpPr/>
+        <p:nvPr/>
+      </p:nvGrpSpPr>
+      <p:grpSpPr>
+        <a:xfrm>
+          <a:off x="0" y="0"/>
+          <a:ext cx="0" cy="0"/>
+          <a:chOff x="0" y="0"/>
+          <a:chExt cx="0" cy="0"/>
+        </a:xfrm>
+      </p:grpSpPr>
+      <p:sp>
+        <p:nvSpPr>
+          <p:cNvPr id="456" name="Google Shape;456;g2c74f300a7c_0_15:notes"/>
+          <p:cNvSpPr/>
+          <p:nvPr>
+            <p:ph idx="2" type="sldImg"/>
+          </p:nvPr>
+        </p:nvSpPr>
+        <p:spPr>
+          <a:xfrm>
+            <a:off x="381300" y="685800"/>
+            <a:ext cx="6096000" cy="3429000"/>
+          </a:xfrm>
+          <a:custGeom>
+            <a:rect b="b" l="l" r="r" t="t"/>
+            <a:pathLst>
+              <a:path extrusionOk="0" h="120000" w="120000">
+                <a:moveTo>
+                  <a:pt x="0" y="0"/>
+                </a:moveTo>
+                <a:lnTo>
+                  <a:pt x="120000" y="0"/>
+                </a:lnTo>
+                <a:lnTo>
+                  <a:pt x="120000" y="120000"/>
+                </a:lnTo>
+                <a:lnTo>
+                  <a:pt x="0" y="120000"/>
+                </a:lnTo>
+                <a:close/>
+              </a:path>
+            </a:pathLst>
+          </a:custGeom>
+        </p:spPr>
+      </p:sp>
+      <p:sp>
+        <p:nvSpPr>
+          <p:cNvPr id="457" name="Google Shape;457;g2c74f300a7c_0_15:notes"/>
+          <p:cNvSpPr txBox="1"/>
+          <p:nvPr>
+            <p:ph idx="1" type="body"/>
+          </p:nvPr>
+        </p:nvSpPr>
+        <p:spPr>
+          <a:xfrm>
+            <a:off x="685800" y="4343400"/>
+            <a:ext cx="5486400" cy="4114800"/>
+          </a:xfrm>
+          <a:prstGeom prst="rect">
+            <a:avLst/>
+          </a:prstGeom>
+        </p:spPr>
+        <p:txBody>
+          <a:bodyPr anchorCtr="0" anchor="t" bIns="91425" lIns="91425" spcFirstLastPara="1" rIns="91425" wrap="square" tIns="91425">
+            <a:noAutofit/>
+          </a:bodyPr>
+          <a:lstStyle/>
+          <a:p>
+            <a:pPr indent="0" lvl="0" marL="0" rtl="0" algn="l">
+              <a:spcBef>
+                <a:spcPts val="0"/>
+              </a:spcBef>
+              <a:spcAft>
+                <a:spcPts val="0"/>
+              </a:spcAft>
+              <a:buNone/>
+            </a:pPr>
+            <a:r>
+              <a:t/>
+            </a:r>
+            <a:endParaRPr/>
+          </a:p>
+        </p:txBody>
+      </p:sp>
+    </p:spTree>
+  </p:cSld>
+  <p:clrMapOvr>
+    <a:masterClrMapping/>
+  </p:clrMapOvr>
+</p:notes>
+</file>
+
+<file path=ppt/notesSlides/notesSlide77.xml><?xml version="1.0" encoding="utf-8"?>
+<p:notes xmlns:a="http://schemas.openxmlformats.org/drawingml/2006/main" xmlns:r="http://schemas.openxmlformats.org/officeDocument/2006/relationships" xmlns:mc="http://schemas.openxmlformats.org/markup-compatibility/2006" xmlns:mv="urn:schemas-microsoft-com:mac:vml" xmlns:p="http://schemas.openxmlformats.org/presentationml/2006/main" xmlns:c="http://schemas.openxmlformats.org/drawingml/2006/chart" xmlns:dgm="http://schemas.openxmlformats.org/drawingml/2006/diagram" xmlns:o="urn:schemas-microsoft-com:office:office" xmlns:v="urn:schemas-microsoft-com:vml" xmlns:pvml="urn:schemas-microsoft-com:office:powerpoint" xmlns:com="http://schemas.openxmlformats.org/drawingml/2006/compatibility" xmlns:p14="http://schemas.microsoft.com/office/powerpoint/2010/main" xmlns:p15="http://schemas.microsoft.com/office/powerpoint/2012/main" xmlns:ahyp="http://schemas.microsoft.com/office/drawing/2018/hyperlinkcolor" showMasterPhAnim="0" showMasterSp="0">
+  <p:cSld>
+    <p:spTree>
+      <p:nvGrpSpPr>
+        <p:cNvPr id="460" name="Shape 460"/>
+        <p:cNvGrpSpPr/>
+        <p:nvPr/>
+      </p:nvGrpSpPr>
+      <p:grpSpPr>
+        <a:xfrm>
+          <a:off x="0" y="0"/>
+          <a:ext cx="0" cy="0"/>
+          <a:chOff x="0" y="0"/>
+          <a:chExt cx="0" cy="0"/>
+        </a:xfrm>
+      </p:grpSpPr>
+      <p:sp>
+        <p:nvSpPr>
+          <p:cNvPr id="461" name="Google Shape;461;g2b3937a3876_0_15:notes"/>
+          <p:cNvSpPr/>
+          <p:nvPr>
+            <p:ph idx="2" type="sldImg"/>
+          </p:nvPr>
+        </p:nvSpPr>
+        <p:spPr>
+          <a:xfrm>
+            <a:off x="381300" y="685800"/>
+            <a:ext cx="6096000" cy="3429000"/>
+          </a:xfrm>
+          <a:custGeom>
+            <a:rect b="b" l="l" r="r" t="t"/>
+            <a:pathLst>
+              <a:path extrusionOk="0" h="120000" w="120000">
+                <a:moveTo>
+                  <a:pt x="0" y="0"/>
+                </a:moveTo>
+                <a:lnTo>
+                  <a:pt x="120000" y="0"/>
+                </a:lnTo>
+                <a:lnTo>
+                  <a:pt x="120000" y="120000"/>
+                </a:lnTo>
+                <a:lnTo>
+                  <a:pt x="0" y="120000"/>
+                </a:lnTo>
+                <a:close/>
+              </a:path>
+            </a:pathLst>
+          </a:custGeom>
+        </p:spPr>
+      </p:sp>
+      <p:sp>
+        <p:nvSpPr>
+          <p:cNvPr id="462" name="Google Shape;462;g2b3937a3876_0_15:notes"/>
           <p:cNvSpPr txBox="1"/>
           <p:nvPr>
             <p:ph idx="1" type="body"/>
@@ -39682,6 +40382,1690 @@
           <p:cNvPr id="429" name="Google Shape;429;p82"/>
           <p:cNvSpPr txBox="1"/>
           <p:nvPr>
+            <p:ph idx="1" type="body"/>
+          </p:nvPr>
+        </p:nvSpPr>
+        <p:spPr>
+          <a:xfrm>
+            <a:off x="0" y="0"/>
+            <a:ext cx="9144000" cy="5049600"/>
+          </a:xfrm>
+          <a:prstGeom prst="rect">
+            <a:avLst/>
+          </a:prstGeom>
+        </p:spPr>
+        <p:txBody>
+          <a:bodyPr anchorCtr="0" anchor="t" bIns="91425" lIns="91425" spcFirstLastPara="1" rIns="91425" wrap="square" tIns="91425">
+            <a:normAutofit/>
+          </a:bodyPr>
+          <a:lstStyle/>
+          <a:p>
+            <a:pPr indent="0" lvl="0" marL="0" rtl="0" algn="l">
+              <a:lnSpc>
+                <a:spcPct val="100000"/>
+              </a:lnSpc>
+              <a:spcBef>
+                <a:spcPts val="0"/>
+              </a:spcBef>
+              <a:spcAft>
+                <a:spcPts val="0"/>
+              </a:spcAft>
+              <a:buNone/>
+            </a:pPr>
+            <a:r>
+              <a:rPr lang="ja" sz="1200" u="sng"/>
+              <a:t> TrustAI at SemEval-2024 Task 8: A Comprehensive Analysis of Multi-domain Machine Generated Text Detection Techniques SemEval-2024 タスク8におけるTrustAI: 多領域機械生成テキスト検出技術の包括的分析</a:t>
+            </a:r>
+            <a:r>
+              <a:rPr lang="ja" sz="1200" u="sng"/>
+              <a:t> 2024</a:t>
+            </a:r>
+            <a:endParaRPr sz="1100"/>
+          </a:p>
+          <a:p>
+            <a:pPr indent="0" lvl="0" marL="0" rtl="0" algn="l">
+              <a:lnSpc>
+                <a:spcPct val="100000"/>
+              </a:lnSpc>
+              <a:spcBef>
+                <a:spcPts val="1200"/>
+              </a:spcBef>
+              <a:spcAft>
+                <a:spcPts val="0"/>
+              </a:spcAft>
+              <a:buNone/>
+            </a:pPr>
+            <a:r>
+              <a:rPr lang="ja" sz="1100" u="sng"/>
+              <a:t>概要</a:t>
+            </a:r>
+            <a:endParaRPr sz="764"/>
+          </a:p>
+          <a:p>
+            <a:pPr indent="0" lvl="0" marL="0" rtl="0" algn="l">
+              <a:lnSpc>
+                <a:spcPct val="100000"/>
+              </a:lnSpc>
+              <a:spcBef>
+                <a:spcPts val="1200"/>
+              </a:spcBef>
+              <a:spcAft>
+                <a:spcPts val="0"/>
+              </a:spcAft>
+              <a:buNone/>
+            </a:pPr>
+            <a:r>
+              <a:rPr lang="ja" sz="764"/>
+              <a:t>LLMが書いた文章と人間が書いた文章を見分ける技術について説明しています。LLMが、ニュース記事や小説のような文章を自動で生成できるが、偽情報や個人情報の漏えいなどの問題を引き起こす可能性もあります。</a:t>
+            </a:r>
+            <a:r>
+              <a:rPr lang="ja" sz="764"/>
+              <a:t>ここではLLMが生成したテキストを検出する手法を開発し、その有効性を検証しています。</a:t>
+            </a:r>
+            <a:endParaRPr sz="764"/>
+          </a:p>
+          <a:p>
+            <a:pPr indent="0" lvl="0" marL="0" rtl="0" algn="l">
+              <a:lnSpc>
+                <a:spcPct val="100000"/>
+              </a:lnSpc>
+              <a:spcBef>
+                <a:spcPts val="1200"/>
+              </a:spcBef>
+              <a:spcAft>
+                <a:spcPts val="0"/>
+              </a:spcAft>
+              <a:buNone/>
+            </a:pPr>
+            <a:r>
+              <a:rPr lang="ja" sz="1100" u="sng"/>
+              <a:t>手法</a:t>
+            </a:r>
+            <a:endParaRPr sz="800"/>
+          </a:p>
+          <a:p>
+            <a:pPr indent="0" lvl="0" marL="0" rtl="0" algn="l">
+              <a:lnSpc>
+                <a:spcPct val="100000"/>
+              </a:lnSpc>
+              <a:spcBef>
+                <a:spcPts val="1200"/>
+              </a:spcBef>
+              <a:spcAft>
+                <a:spcPts val="0"/>
+              </a:spcAft>
+              <a:buNone/>
+            </a:pPr>
+            <a:r>
+              <a:rPr lang="ja" sz="764"/>
+              <a:t>統計的方法、ニューラルネットワーク、事前訓練済みモデルを含む複数のアプローチを用いて、機械生成テキストの検出を試みます。特に、異なる種類の埋め込みを使用した統計モデル、FastText埋め込みを使用したニューラルモデル、BERTやRoBERTaなどの事前訓練済みモデルの実験が含まれます。</a:t>
+            </a:r>
+            <a:endParaRPr sz="764"/>
+          </a:p>
+          <a:p>
+            <a:pPr indent="0" lvl="0" marL="0" rtl="0" algn="l">
+              <a:lnSpc>
+                <a:spcPct val="100000"/>
+              </a:lnSpc>
+              <a:spcBef>
+                <a:spcPts val="1200"/>
+              </a:spcBef>
+              <a:spcAft>
+                <a:spcPts val="0"/>
+              </a:spcAft>
+              <a:buNone/>
+            </a:pPr>
+            <a:r>
+              <a:rPr lang="ja" sz="1100" u="sng"/>
+              <a:t>結果</a:t>
+            </a:r>
+            <a:endParaRPr sz="764"/>
+          </a:p>
+          <a:p>
+            <a:pPr indent="0" lvl="0" marL="0" rtl="0" algn="l">
+              <a:lnSpc>
+                <a:spcPct val="100000"/>
+              </a:lnSpc>
+              <a:spcBef>
+                <a:spcPts val="1200"/>
+              </a:spcBef>
+              <a:spcAft>
+                <a:spcPts val="0"/>
+              </a:spcAft>
+              <a:buNone/>
+            </a:pPr>
+            <a:r>
+              <a:rPr lang="ja" sz="764"/>
+              <a:t>統計モデル、ニューラルモデル、事前訓練済みモデルを使用した実験結果から、様々なテキスト検出手法の有効性を評価しました。特に、統計的アプローチは開発セットでモデストなパフォーマンスを示しましたが、テストセットに対しては効果的に一般化しました。事前訓練済みモデルは開発セットで良好なパフォーマンスを示しましたが、テストセットでは一般化するのに苦労しました。</a:t>
+            </a:r>
+            <a:endParaRPr sz="764"/>
+          </a:p>
+          <a:p>
+            <a:pPr indent="0" lvl="0" marL="0" rtl="0" algn="l">
+              <a:lnSpc>
+                <a:spcPct val="100000"/>
+              </a:lnSpc>
+              <a:spcBef>
+                <a:spcPts val="1200"/>
+              </a:spcBef>
+              <a:spcAft>
+                <a:spcPts val="1200"/>
+              </a:spcAft>
+              <a:buNone/>
+            </a:pPr>
+            <a:r>
+              <a:t/>
+            </a:r>
+            <a:endParaRPr sz="764"/>
+          </a:p>
+        </p:txBody>
+      </p:sp>
+    </p:spTree>
+  </p:cSld>
+  <p:clrMapOvr>
+    <a:masterClrMapping/>
+  </p:clrMapOvr>
+</p:sld>
+</file>
+
+<file path=ppt/slides/slide71.xml><?xml version="1.0" encoding="utf-8"?>
+<p:sld xmlns:a="http://schemas.openxmlformats.org/drawingml/2006/main" xmlns:r="http://schemas.openxmlformats.org/officeDocument/2006/relationships" xmlns:mc="http://schemas.openxmlformats.org/markup-compatibility/2006" xmlns:mv="urn:schemas-microsoft-com:mac:vml" xmlns:p="http://schemas.openxmlformats.org/presentationml/2006/main" xmlns:c="http://schemas.openxmlformats.org/drawingml/2006/chart" xmlns:dgm="http://schemas.openxmlformats.org/drawingml/2006/diagram" xmlns:o="urn:schemas-microsoft-com:office:office" xmlns:v="urn:schemas-microsoft-com:vml" xmlns:pvml="urn:schemas-microsoft-com:office:powerpoint" xmlns:com="http://schemas.openxmlformats.org/drawingml/2006/compatibility" xmlns:p14="http://schemas.microsoft.com/office/powerpoint/2010/main" xmlns:p15="http://schemas.microsoft.com/office/powerpoint/2012/main" xmlns:ahyp="http://schemas.microsoft.com/office/drawing/2018/hyperlinkcolor">
+  <p:cSld>
+    <p:spTree>
+      <p:nvGrpSpPr>
+        <p:cNvPr id="433" name="Shape 433"/>
+        <p:cNvGrpSpPr/>
+        <p:nvPr/>
+      </p:nvGrpSpPr>
+      <p:grpSpPr>
+        <a:xfrm>
+          <a:off x="0" y="0"/>
+          <a:ext cx="0" cy="0"/>
+          <a:chOff x="0" y="0"/>
+          <a:chExt cx="0" cy="0"/>
+        </a:xfrm>
+      </p:grpSpPr>
+      <p:sp>
+        <p:nvSpPr>
+          <p:cNvPr id="434" name="Google Shape;434;p83"/>
+          <p:cNvSpPr txBox="1"/>
+          <p:nvPr>
+            <p:ph idx="1" type="body"/>
+          </p:nvPr>
+        </p:nvSpPr>
+        <p:spPr>
+          <a:xfrm>
+            <a:off x="0" y="0"/>
+            <a:ext cx="9144000" cy="5049600"/>
+          </a:xfrm>
+          <a:prstGeom prst="rect">
+            <a:avLst/>
+          </a:prstGeom>
+        </p:spPr>
+        <p:txBody>
+          <a:bodyPr anchorCtr="0" anchor="t" bIns="91425" lIns="91425" spcFirstLastPara="1" rIns="91425" wrap="square" tIns="91425">
+            <a:normAutofit/>
+          </a:bodyPr>
+          <a:lstStyle/>
+          <a:p>
+            <a:pPr indent="0" lvl="0" marL="0" rtl="0" algn="l">
+              <a:lnSpc>
+                <a:spcPct val="100000"/>
+              </a:lnSpc>
+              <a:spcBef>
+                <a:spcPts val="0"/>
+              </a:spcBef>
+              <a:spcAft>
+                <a:spcPts val="0"/>
+              </a:spcAft>
+              <a:buNone/>
+            </a:pPr>
+            <a:r>
+              <a:rPr lang="ja" sz="1200" u="sng"/>
+              <a:t>Harnessing the power of LLMs for normative reasoning in MASs MASにおける規範推論のためのLLMの力を活用する</a:t>
+            </a:r>
+            <a:r>
+              <a:rPr lang="ja" sz="1200" u="sng"/>
+              <a:t> 2024</a:t>
+            </a:r>
+            <a:endParaRPr sz="1100"/>
+          </a:p>
+          <a:p>
+            <a:pPr indent="0" lvl="0" marL="0" rtl="0" algn="l">
+              <a:lnSpc>
+                <a:spcPct val="100000"/>
+              </a:lnSpc>
+              <a:spcBef>
+                <a:spcPts val="1200"/>
+              </a:spcBef>
+              <a:spcAft>
+                <a:spcPts val="0"/>
+              </a:spcAft>
+              <a:buNone/>
+            </a:pPr>
+            <a:r>
+              <a:rPr lang="ja" sz="1100" u="sng"/>
+              <a:t>概要</a:t>
+            </a:r>
+            <a:endParaRPr sz="764"/>
+          </a:p>
+          <a:p>
+            <a:pPr indent="0" lvl="0" marL="0" rtl="0" algn="l">
+              <a:lnSpc>
+                <a:spcPct val="100000"/>
+              </a:lnSpc>
+              <a:spcBef>
+                <a:spcPts val="1200"/>
+              </a:spcBef>
+              <a:spcAft>
+                <a:spcPts val="0"/>
+              </a:spcAft>
+              <a:buNone/>
+            </a:pPr>
+            <a:r>
+              <a:rPr lang="ja" sz="764"/>
+              <a:t>LLM</a:t>
+            </a:r>
+            <a:r>
+              <a:rPr lang="ja" sz="764"/>
+              <a:t>が人間のように「規則」を理解して、それに従う方法をLLMエージェントアプローチを拡張して、規範LLMエージェントを実装する方法を検討。</a:t>
+            </a:r>
+            <a:br>
+              <a:rPr lang="ja" sz="764"/>
+            </a:br>
+            <a:endParaRPr sz="764"/>
+          </a:p>
+          <a:p>
+            <a:pPr indent="0" lvl="0" marL="0" rtl="0" algn="l">
+              <a:lnSpc>
+                <a:spcPct val="100000"/>
+              </a:lnSpc>
+              <a:spcBef>
+                <a:spcPts val="1200"/>
+              </a:spcBef>
+              <a:spcAft>
+                <a:spcPts val="0"/>
+              </a:spcAft>
+              <a:buNone/>
+            </a:pPr>
+            <a:r>
+              <a:rPr lang="ja" sz="1100" u="sng"/>
+              <a:t>手法</a:t>
+            </a:r>
+            <a:endParaRPr sz="800"/>
+          </a:p>
+          <a:p>
+            <a:pPr indent="0" lvl="0" marL="0" rtl="0" algn="l">
+              <a:lnSpc>
+                <a:spcPct val="100000"/>
+              </a:lnSpc>
+              <a:spcBef>
+                <a:spcPts val="1200"/>
+              </a:spcBef>
+              <a:spcAft>
+                <a:spcPts val="0"/>
+              </a:spcAft>
+              <a:buNone/>
+            </a:pPr>
+            <a:r>
+              <a:rPr lang="ja" sz="764"/>
+              <a:t>規則の学び方:</a:t>
+            </a:r>
+            <a:br>
+              <a:rPr lang="ja" sz="764"/>
+            </a:br>
+            <a:r>
+              <a:rPr lang="ja" sz="764"/>
+              <a:t>規則の発見: LLMに、「この状況ではどんな規則が適用される？」と問いかけて答えを探します。</a:t>
+            </a:r>
+            <a:br>
+              <a:rPr lang="ja" sz="764"/>
+            </a:br>
+            <a:r>
+              <a:rPr lang="ja" sz="764"/>
+              <a:t>規則の推論: 学んだ規則を使って、新しい状況でどのように行動すれば良いかを考えます。</a:t>
+            </a:r>
+            <a:br>
+              <a:rPr lang="ja" sz="764"/>
+            </a:br>
+            <a:r>
+              <a:rPr lang="ja" sz="764"/>
+              <a:t>規則の遵守: 推論した結果をもとに、規則に従った行動を選びます。</a:t>
+            </a:r>
+            <a:endParaRPr sz="764"/>
+          </a:p>
+          <a:p>
+            <a:pPr indent="0" lvl="0" marL="0" rtl="0" algn="l">
+              <a:lnSpc>
+                <a:spcPct val="100000"/>
+              </a:lnSpc>
+              <a:spcBef>
+                <a:spcPts val="1200"/>
+              </a:spcBef>
+              <a:spcAft>
+                <a:spcPts val="0"/>
+              </a:spcAft>
+              <a:buNone/>
+            </a:pPr>
+            <a:r>
+              <a:rPr lang="ja" sz="764"/>
+              <a:t>この研究では具体的な数式やアルゴリズムよりも、LLMがどのように規則を学んで理解し、それを元に判断して行動するかというプロセスに焦点を当てています。このプロセスは、問いかけ（質問）とそれに対する答え（回答）の形で行われます。</a:t>
+            </a:r>
+            <a:endParaRPr sz="764"/>
+          </a:p>
+          <a:p>
+            <a:pPr indent="0" lvl="0" marL="0" rtl="0" algn="l">
+              <a:lnSpc>
+                <a:spcPct val="100000"/>
+              </a:lnSpc>
+              <a:spcBef>
+                <a:spcPts val="1200"/>
+              </a:spcBef>
+              <a:spcAft>
+                <a:spcPts val="0"/>
+              </a:spcAft>
+              <a:buNone/>
+            </a:pPr>
+            <a:r>
+              <a:rPr lang="ja" sz="1100" u="sng"/>
+              <a:t>結果</a:t>
+            </a:r>
+            <a:endParaRPr sz="764"/>
+          </a:p>
+          <a:p>
+            <a:pPr indent="0" lvl="0" marL="0" rtl="0" algn="l">
+              <a:lnSpc>
+                <a:spcPct val="100000"/>
+              </a:lnSpc>
+              <a:spcBef>
+                <a:spcPts val="1200"/>
+              </a:spcBef>
+              <a:spcAft>
+                <a:spcPts val="0"/>
+              </a:spcAft>
+              <a:buNone/>
+            </a:pPr>
+            <a:r>
+              <a:rPr lang="ja" sz="764"/>
+              <a:t>LLMが実際に「規則」を学び、新しい状況に適用することができるかどうかを試しました。例えば、子供が扱うには危険な物を求めたとき、LLMがどのように安全な代替案を提案するかなどです。結果として、LLMは多くの場合で人間のように規則を理解し、適切な行動を推論することができることがわかりました。</a:t>
+            </a:r>
+            <a:endParaRPr sz="764"/>
+          </a:p>
+          <a:p>
+            <a:pPr indent="0" lvl="0" marL="0" rtl="0" algn="l">
+              <a:lnSpc>
+                <a:spcPct val="100000"/>
+              </a:lnSpc>
+              <a:spcBef>
+                <a:spcPts val="1200"/>
+              </a:spcBef>
+              <a:spcAft>
+                <a:spcPts val="1200"/>
+              </a:spcAft>
+              <a:buNone/>
+            </a:pPr>
+            <a:r>
+              <a:t/>
+            </a:r>
+            <a:endParaRPr sz="764"/>
+          </a:p>
+        </p:txBody>
+      </p:sp>
+    </p:spTree>
+  </p:cSld>
+  <p:clrMapOvr>
+    <a:masterClrMapping/>
+  </p:clrMapOvr>
+</p:sld>
+</file>
+
+<file path=ppt/slides/slide72.xml><?xml version="1.0" encoding="utf-8"?>
+<p:sld xmlns:a="http://schemas.openxmlformats.org/drawingml/2006/main" xmlns:r="http://schemas.openxmlformats.org/officeDocument/2006/relationships" xmlns:mc="http://schemas.openxmlformats.org/markup-compatibility/2006" xmlns:mv="urn:schemas-microsoft-com:mac:vml" xmlns:p="http://schemas.openxmlformats.org/presentationml/2006/main" xmlns:c="http://schemas.openxmlformats.org/drawingml/2006/chart" xmlns:dgm="http://schemas.openxmlformats.org/drawingml/2006/diagram" xmlns:o="urn:schemas-microsoft-com:office:office" xmlns:v="urn:schemas-microsoft-com:vml" xmlns:pvml="urn:schemas-microsoft-com:office:powerpoint" xmlns:com="http://schemas.openxmlformats.org/drawingml/2006/compatibility" xmlns:p14="http://schemas.microsoft.com/office/powerpoint/2010/main" xmlns:p15="http://schemas.microsoft.com/office/powerpoint/2012/main" xmlns:ahyp="http://schemas.microsoft.com/office/drawing/2018/hyperlinkcolor">
+  <p:cSld>
+    <p:spTree>
+      <p:nvGrpSpPr>
+        <p:cNvPr id="438" name="Shape 438"/>
+        <p:cNvGrpSpPr/>
+        <p:nvPr/>
+      </p:nvGrpSpPr>
+      <p:grpSpPr>
+        <a:xfrm>
+          <a:off x="0" y="0"/>
+          <a:ext cx="0" cy="0"/>
+          <a:chOff x="0" y="0"/>
+          <a:chExt cx="0" cy="0"/>
+        </a:xfrm>
+      </p:grpSpPr>
+      <p:sp>
+        <p:nvSpPr>
+          <p:cNvPr id="439" name="Google Shape;439;p84"/>
+          <p:cNvSpPr txBox="1"/>
+          <p:nvPr>
+            <p:ph idx="1" type="body"/>
+          </p:nvPr>
+        </p:nvSpPr>
+        <p:spPr>
+          <a:xfrm>
+            <a:off x="0" y="0"/>
+            <a:ext cx="9144000" cy="5049600"/>
+          </a:xfrm>
+          <a:prstGeom prst="rect">
+            <a:avLst/>
+          </a:prstGeom>
+        </p:spPr>
+        <p:txBody>
+          <a:bodyPr anchorCtr="0" anchor="t" bIns="91425" lIns="91425" spcFirstLastPara="1" rIns="91425" wrap="square" tIns="91425">
+            <a:normAutofit/>
+          </a:bodyPr>
+          <a:lstStyle/>
+          <a:p>
+            <a:pPr indent="0" lvl="0" marL="0" rtl="0" algn="l">
+              <a:lnSpc>
+                <a:spcPct val="100000"/>
+              </a:lnSpc>
+              <a:spcBef>
+                <a:spcPts val="0"/>
+              </a:spcBef>
+              <a:spcAft>
+                <a:spcPts val="0"/>
+              </a:spcAft>
+              <a:buNone/>
+            </a:pPr>
+            <a:r>
+              <a:rPr lang="ja" sz="1200" u="sng"/>
+              <a:t>LARA: Linguistic-Adaptive Retrieval-Augmented LLMs for Multi-Turn Intent Classification LARA: 多ターンインテント分類のための言語適応型検索拡張LLM</a:t>
+            </a:r>
+            <a:r>
+              <a:rPr lang="ja" sz="1200" u="sng"/>
+              <a:t> 2024</a:t>
+            </a:r>
+            <a:endParaRPr sz="1100"/>
+          </a:p>
+          <a:p>
+            <a:pPr indent="0" lvl="0" marL="0" rtl="0" algn="l">
+              <a:lnSpc>
+                <a:spcPct val="100000"/>
+              </a:lnSpc>
+              <a:spcBef>
+                <a:spcPts val="1200"/>
+              </a:spcBef>
+              <a:spcAft>
+                <a:spcPts val="0"/>
+              </a:spcAft>
+              <a:buNone/>
+            </a:pPr>
+            <a:r>
+              <a:rPr lang="ja" sz="1100" u="sng"/>
+              <a:t>概要</a:t>
+            </a:r>
+            <a:endParaRPr sz="764"/>
+          </a:p>
+          <a:p>
+            <a:pPr indent="0" lvl="0" marL="0" rtl="0" algn="l">
+              <a:lnSpc>
+                <a:spcPct val="100000"/>
+              </a:lnSpc>
+              <a:spcBef>
+                <a:spcPts val="1200"/>
+              </a:spcBef>
+              <a:spcAft>
+                <a:spcPts val="0"/>
+              </a:spcAft>
+              <a:buNone/>
+            </a:pPr>
+            <a:r>
+              <a:rPr lang="ja" sz="764"/>
+              <a:t>チャットボットのやり取りで多数のインテント＝意図を含む、多言語での多ターン分類タスクにおける精度向上を目的とした、LARA（Linguistic-Adaptive Retrieval-Augmented Language Models）を紹介</a:t>
+            </a:r>
+            <a:br>
+              <a:rPr lang="ja" sz="764"/>
+            </a:br>
+            <a:r>
+              <a:rPr lang="ja" sz="764"/>
+              <a:t>会話が何回も続く「多ターン」の状況と、さまざまな言語での会話を対象にし、従来の方法よりも正確に意図を理解できるようにします。</a:t>
+            </a:r>
+            <a:endParaRPr sz="764"/>
+          </a:p>
+          <a:p>
+            <a:pPr indent="0" lvl="0" marL="0" rtl="0" algn="l">
+              <a:lnSpc>
+                <a:spcPct val="100000"/>
+              </a:lnSpc>
+              <a:spcBef>
+                <a:spcPts val="1200"/>
+              </a:spcBef>
+              <a:spcAft>
+                <a:spcPts val="0"/>
+              </a:spcAft>
+              <a:buNone/>
+            </a:pPr>
+            <a:r>
+              <a:rPr lang="ja" sz="1100" u="sng"/>
+              <a:t>手法</a:t>
+            </a:r>
+            <a:endParaRPr sz="800"/>
+          </a:p>
+          <a:p>
+            <a:pPr indent="0" lvl="0" marL="0" rtl="0" algn="l">
+              <a:lnSpc>
+                <a:spcPct val="100000"/>
+              </a:lnSpc>
+              <a:spcBef>
+                <a:spcPts val="1200"/>
+              </a:spcBef>
+              <a:spcAft>
+                <a:spcPts val="0"/>
+              </a:spcAft>
+              <a:buNone/>
+            </a:pPr>
+            <a:r>
+              <a:rPr lang="ja" sz="764"/>
+              <a:t>LARAのアルゴリズムは主に2つのステップから成り立っています。</a:t>
+            </a:r>
+            <a:endParaRPr sz="764"/>
+          </a:p>
+          <a:p>
+            <a:pPr indent="0" lvl="0" marL="0" rtl="0" algn="l">
+              <a:lnSpc>
+                <a:spcPct val="100000"/>
+              </a:lnSpc>
+              <a:spcBef>
+                <a:spcPts val="1200"/>
+              </a:spcBef>
+              <a:spcAft>
+                <a:spcPts val="0"/>
+              </a:spcAft>
+              <a:buNone/>
+            </a:pPr>
+            <a:r>
+              <a:rPr lang="ja" sz="764"/>
+              <a:t>1. 候補インテントの選択: まず、今までの会話（歴史的な発言）を見て、次にユーザーがどのような意図を持っているのか予測します。これを「候補インテント」と呼びます。この予測には、「XLM」という言語モデルを使用します。これにより、たくさんある意図（インテント）の中から、最も可能性の高いものを選び出します。</a:t>
+            </a:r>
+            <a:endParaRPr sz="764"/>
+          </a:p>
+          <a:p>
+            <a:pPr indent="0" lvl="0" marL="0" rtl="0" algn="l">
+              <a:lnSpc>
+                <a:spcPct val="100000"/>
+              </a:lnSpc>
+              <a:spcBef>
+                <a:spcPts val="1200"/>
+              </a:spcBef>
+              <a:spcAft>
+                <a:spcPts val="0"/>
+              </a:spcAft>
+              <a:buNone/>
+            </a:pPr>
+            <a:r>
+              <a:rPr lang="ja" sz="764"/>
+              <a:t>2. 検索拡張: 次に、選ばれた候補インテントに基づき、似たような過去の会話例をデータベースから探し出します。これにより、コンピュータは過去の似たような会話から学び、現在の会話の意図をより正確に理解することができます。</a:t>
+            </a:r>
+            <a:endParaRPr sz="764"/>
+          </a:p>
+          <a:p>
+            <a:pPr indent="0" lvl="0" marL="0" rtl="0" algn="l">
+              <a:lnSpc>
+                <a:spcPct val="100000"/>
+              </a:lnSpc>
+              <a:spcBef>
+                <a:spcPts val="1200"/>
+              </a:spcBef>
+              <a:spcAft>
+                <a:spcPts val="0"/>
+              </a:spcAft>
+              <a:buNone/>
+            </a:pPr>
+            <a:r>
+              <a:rPr lang="ja" sz="1100" u="sng"/>
+              <a:t>結果</a:t>
+            </a:r>
+            <a:endParaRPr sz="764"/>
+          </a:p>
+          <a:p>
+            <a:pPr indent="0" lvl="0" marL="0" rtl="0" algn="l">
+              <a:lnSpc>
+                <a:spcPct val="100000"/>
+              </a:lnSpc>
+              <a:spcBef>
+                <a:spcPts val="1200"/>
+              </a:spcBef>
+              <a:spcAft>
+                <a:spcPts val="1200"/>
+              </a:spcAft>
+              <a:buNone/>
+            </a:pPr>
+            <a:r>
+              <a:rPr lang="ja" sz="764"/>
+              <a:t>LARAを実際のeコマースのデータセットに適用し、6つの異なる言語でテストしました。結果、LARAは従来の方法よりも、平均で3.67%高い精度で意図を理解できることがわかりました。これは、多言語にわたる多ターンの会話理解において、LARAが有効であることを示しています。</a:t>
+            </a:r>
+            <a:endParaRPr sz="764"/>
+          </a:p>
+        </p:txBody>
+      </p:sp>
+    </p:spTree>
+  </p:cSld>
+  <p:clrMapOvr>
+    <a:masterClrMapping/>
+  </p:clrMapOvr>
+</p:sld>
+</file>
+
+<file path=ppt/slides/slide73.xml><?xml version="1.0" encoding="utf-8"?>
+<p:sld xmlns:a="http://schemas.openxmlformats.org/drawingml/2006/main" xmlns:r="http://schemas.openxmlformats.org/officeDocument/2006/relationships" xmlns:mc="http://schemas.openxmlformats.org/markup-compatibility/2006" xmlns:mv="urn:schemas-microsoft-com:mac:vml" xmlns:p="http://schemas.openxmlformats.org/presentationml/2006/main" xmlns:c="http://schemas.openxmlformats.org/drawingml/2006/chart" xmlns:dgm="http://schemas.openxmlformats.org/drawingml/2006/diagram" xmlns:o="urn:schemas-microsoft-com:office:office" xmlns:v="urn:schemas-microsoft-com:vml" xmlns:pvml="urn:schemas-microsoft-com:office:powerpoint" xmlns:com="http://schemas.openxmlformats.org/drawingml/2006/compatibility" xmlns:p14="http://schemas.microsoft.com/office/powerpoint/2010/main" xmlns:p15="http://schemas.microsoft.com/office/powerpoint/2012/main" xmlns:ahyp="http://schemas.microsoft.com/office/drawing/2018/hyperlinkcolor">
+  <p:cSld>
+    <p:spTree>
+      <p:nvGrpSpPr>
+        <p:cNvPr id="443" name="Shape 443"/>
+        <p:cNvGrpSpPr/>
+        <p:nvPr/>
+      </p:nvGrpSpPr>
+      <p:grpSpPr>
+        <a:xfrm>
+          <a:off x="0" y="0"/>
+          <a:ext cx="0" cy="0"/>
+          <a:chOff x="0" y="0"/>
+          <a:chExt cx="0" cy="0"/>
+        </a:xfrm>
+      </p:grpSpPr>
+      <p:sp>
+        <p:nvSpPr>
+          <p:cNvPr id="444" name="Google Shape;444;p85"/>
+          <p:cNvSpPr txBox="1"/>
+          <p:nvPr>
+            <p:ph idx="1" type="body"/>
+          </p:nvPr>
+        </p:nvSpPr>
+        <p:spPr>
+          <a:xfrm>
+            <a:off x="0" y="0"/>
+            <a:ext cx="9144000" cy="5049600"/>
+          </a:xfrm>
+          <a:prstGeom prst="rect">
+            <a:avLst/>
+          </a:prstGeom>
+        </p:spPr>
+        <p:txBody>
+          <a:bodyPr anchorCtr="0" anchor="t" bIns="91425" lIns="91425" spcFirstLastPara="1" rIns="91425" wrap="square" tIns="91425">
+            <a:normAutofit/>
+          </a:bodyPr>
+          <a:lstStyle/>
+          <a:p>
+            <a:pPr indent="0" lvl="0" marL="0" rtl="0" algn="l">
+              <a:lnSpc>
+                <a:spcPct val="100000"/>
+              </a:lnSpc>
+              <a:spcBef>
+                <a:spcPts val="0"/>
+              </a:spcBef>
+              <a:spcAft>
+                <a:spcPts val="0"/>
+              </a:spcAft>
+              <a:buNone/>
+            </a:pPr>
+            <a:r>
+              <a:rPr lang="ja" sz="1200" u="sng"/>
+              <a:t>CODES: Natural Language to Code Repository via Multi-Layer Sketch CODES: 多層スケッチを用いた自然言語からのコードリポジトリ生成</a:t>
+            </a:r>
+            <a:r>
+              <a:rPr lang="ja" sz="1200" u="sng"/>
+              <a:t> 2024</a:t>
+            </a:r>
+            <a:endParaRPr sz="1100"/>
+          </a:p>
+          <a:p>
+            <a:pPr indent="0" lvl="0" marL="0" rtl="0" algn="l">
+              <a:lnSpc>
+                <a:spcPct val="100000"/>
+              </a:lnSpc>
+              <a:spcBef>
+                <a:spcPts val="1200"/>
+              </a:spcBef>
+              <a:spcAft>
+                <a:spcPts val="0"/>
+              </a:spcAft>
+              <a:buNone/>
+            </a:pPr>
+            <a:r>
+              <a:rPr lang="ja" sz="1100" u="sng"/>
+              <a:t>概要</a:t>
+            </a:r>
+            <a:endParaRPr sz="764"/>
+          </a:p>
+          <a:p>
+            <a:pPr indent="0" lvl="0" marL="0" rtl="0" algn="l">
+              <a:lnSpc>
+                <a:spcPct val="100000"/>
+              </a:lnSpc>
+              <a:spcBef>
+                <a:spcPts val="1200"/>
+              </a:spcBef>
+              <a:spcAft>
+                <a:spcPts val="0"/>
+              </a:spcAft>
+              <a:buNone/>
+            </a:pPr>
+            <a:r>
+              <a:rPr lang="ja" sz="764"/>
+              <a:t>LLM</a:t>
+            </a:r>
+            <a:r>
+              <a:rPr lang="ja" sz="764"/>
+              <a:t>による完全自動化されたソフトウェア開発について、自然言語要件からコードリポジトリ全体を生成する新しいソフトウェアエンジニアリングタスク、Natural Language to Code Repository（NL2Repo）を提案。</a:t>
+            </a:r>
+            <a:br>
+              <a:rPr lang="ja" sz="764"/>
+            </a:br>
+            <a:r>
+              <a:rPr lang="ja" sz="764"/>
+              <a:t>このタスクに対処するために、複数のサブタスクにNL2Repoを分解するシンプルかつ効果的なフレームワークCODESを提案。</a:t>
+            </a:r>
+            <a:br>
+              <a:rPr lang="ja" sz="764"/>
+            </a:br>
+            <a:r>
+              <a:rPr lang="ja" sz="764"/>
+              <a:t>CODESは3つのモジュールを含む: RepoSketcher、FileSketcher、SketchFiller。RepoSketcherはまず、与えられた要件のリポジトリのディレクトリ構造を生成し、FileSketcherは生成された構造内の各ファイルに対してファイルスケッチを生成し、SketchEvalベンチマークとSketchBLEU評価メトリックを使用し、VSCodeプラグインを開発して30人の参加者による実証研究を行なった。</a:t>
+            </a:r>
+            <a:endParaRPr sz="764"/>
+          </a:p>
+          <a:p>
+            <a:pPr indent="0" lvl="0" marL="0" rtl="0" algn="l">
+              <a:lnSpc>
+                <a:spcPct val="100000"/>
+              </a:lnSpc>
+              <a:spcBef>
+                <a:spcPts val="1200"/>
+              </a:spcBef>
+              <a:spcAft>
+                <a:spcPts val="0"/>
+              </a:spcAft>
+              <a:buNone/>
+            </a:pPr>
+            <a:r>
+              <a:rPr lang="ja" sz="1100" u="sng"/>
+              <a:t>手法</a:t>
+            </a:r>
+            <a:endParaRPr sz="800"/>
+          </a:p>
+          <a:p>
+            <a:pPr indent="0" lvl="0" marL="0" rtl="0" algn="l">
+              <a:lnSpc>
+                <a:spcPct val="100000"/>
+              </a:lnSpc>
+              <a:spcBef>
+                <a:spcPts val="1200"/>
+              </a:spcBef>
+              <a:spcAft>
+                <a:spcPts val="0"/>
+              </a:spcAft>
+              <a:buNone/>
+            </a:pPr>
+            <a:r>
+              <a:rPr lang="ja" sz="764"/>
+              <a:t>CODESの仕組みは、大きなプログラム作りの仕事を3つのステップに分けます。</a:t>
+            </a:r>
+            <a:endParaRPr sz="764"/>
+          </a:p>
+          <a:p>
+            <a:pPr indent="0" lvl="0" marL="0" rtl="0" algn="l">
+              <a:lnSpc>
+                <a:spcPct val="100000"/>
+              </a:lnSpc>
+              <a:spcBef>
+                <a:spcPts val="1200"/>
+              </a:spcBef>
+              <a:spcAft>
+                <a:spcPts val="0"/>
+              </a:spcAft>
+              <a:buNone/>
+            </a:pPr>
+            <a:r>
+              <a:rPr lang="ja" sz="764"/>
+              <a:t>1. RepoSketcher（リポスケッチャー）: まず、プログラムの全体像を作ります。どんなフォルダやファイルが必要か、どんな順番で作るかを決めます。</a:t>
+            </a:r>
+            <a:br>
+              <a:rPr lang="ja" sz="764"/>
+            </a:br>
+            <a:r>
+              <a:rPr lang="ja" sz="764"/>
+              <a:t>2. FileSketcher（ファイルスケッチャー）: 次に、各ファイルがどんな役割を持つか、大まかな内容を決めます。</a:t>
+            </a:r>
+            <a:br>
+              <a:rPr lang="ja" sz="764"/>
+            </a:br>
+            <a:r>
+              <a:rPr lang="ja" sz="764"/>
+              <a:t>3. SketchFiller（スケッチフィラー）: 最後に、それぞれのファイルに具体的なコードを書き加えて、プログラムを完成させます。</a:t>
+            </a:r>
+            <a:endParaRPr sz="764"/>
+          </a:p>
+          <a:p>
+            <a:pPr indent="0" lvl="0" marL="0" rtl="0" algn="l">
+              <a:lnSpc>
+                <a:spcPct val="100000"/>
+              </a:lnSpc>
+              <a:spcBef>
+                <a:spcPts val="1200"/>
+              </a:spcBef>
+              <a:spcAft>
+                <a:spcPts val="0"/>
+              </a:spcAft>
+              <a:buNone/>
+            </a:pPr>
+            <a:r>
+              <a:t/>
+            </a:r>
+            <a:endParaRPr sz="764"/>
+          </a:p>
+          <a:p>
+            <a:pPr indent="0" lvl="0" marL="0" rtl="0" algn="l">
+              <a:lnSpc>
+                <a:spcPct val="100000"/>
+              </a:lnSpc>
+              <a:spcBef>
+                <a:spcPts val="1200"/>
+              </a:spcBef>
+              <a:spcAft>
+                <a:spcPts val="0"/>
+              </a:spcAft>
+              <a:buNone/>
+            </a:pPr>
+            <a:r>
+              <a:rPr lang="ja" sz="1100" u="sng"/>
+              <a:t>結果</a:t>
+            </a:r>
+            <a:endParaRPr sz="764"/>
+          </a:p>
+          <a:p>
+            <a:pPr indent="0" lvl="0" marL="0" rtl="0" algn="l">
+              <a:lnSpc>
+                <a:spcPct val="100000"/>
+              </a:lnSpc>
+              <a:spcBef>
+                <a:spcPts val="1200"/>
+              </a:spcBef>
+              <a:spcAft>
+                <a:spcPts val="1200"/>
+              </a:spcAft>
+              <a:buNone/>
+            </a:pPr>
+            <a:r>
+              <a:rPr lang="ja" sz="764"/>
+              <a:t>CODESを使っていろいろなプログラムを自動で作ってみた結果、人が書いたプログラムと比べても遜色ない質のプログラムを自動生成できることがわかりました。特に、小さなプログラムだけでなく、大きなプログラム（リポジトリ）全体を作ることにも成功しました。</a:t>
+            </a:r>
+            <a:endParaRPr sz="764"/>
+          </a:p>
+        </p:txBody>
+      </p:sp>
+    </p:spTree>
+  </p:cSld>
+  <p:clrMapOvr>
+    <a:masterClrMapping/>
+  </p:clrMapOvr>
+</p:sld>
+</file>
+
+<file path=ppt/slides/slide74.xml><?xml version="1.0" encoding="utf-8"?>
+<p:sld xmlns:a="http://schemas.openxmlformats.org/drawingml/2006/main" xmlns:r="http://schemas.openxmlformats.org/officeDocument/2006/relationships" xmlns:mc="http://schemas.openxmlformats.org/markup-compatibility/2006" xmlns:mv="urn:schemas-microsoft-com:mac:vml" xmlns:p="http://schemas.openxmlformats.org/presentationml/2006/main" xmlns:c="http://schemas.openxmlformats.org/drawingml/2006/chart" xmlns:dgm="http://schemas.openxmlformats.org/drawingml/2006/diagram" xmlns:o="urn:schemas-microsoft-com:office:office" xmlns:v="urn:schemas-microsoft-com:vml" xmlns:pvml="urn:schemas-microsoft-com:office:powerpoint" xmlns:com="http://schemas.openxmlformats.org/drawingml/2006/compatibility" xmlns:p14="http://schemas.microsoft.com/office/powerpoint/2010/main" xmlns:p15="http://schemas.microsoft.com/office/powerpoint/2012/main" xmlns:ahyp="http://schemas.microsoft.com/office/drawing/2018/hyperlinkcolor">
+  <p:cSld>
+    <p:spTree>
+      <p:nvGrpSpPr>
+        <p:cNvPr id="448" name="Shape 448"/>
+        <p:cNvGrpSpPr/>
+        <p:nvPr/>
+      </p:nvGrpSpPr>
+      <p:grpSpPr>
+        <a:xfrm>
+          <a:off x="0" y="0"/>
+          <a:ext cx="0" cy="0"/>
+          <a:chOff x="0" y="0"/>
+          <a:chExt cx="0" cy="0"/>
+        </a:xfrm>
+      </p:grpSpPr>
+      <p:sp>
+        <p:nvSpPr>
+          <p:cNvPr id="449" name="Google Shape;449;p86"/>
+          <p:cNvSpPr txBox="1"/>
+          <p:nvPr>
+            <p:ph idx="1" type="body"/>
+          </p:nvPr>
+        </p:nvSpPr>
+        <p:spPr>
+          <a:xfrm>
+            <a:off x="0" y="0"/>
+            <a:ext cx="9144000" cy="5049600"/>
+          </a:xfrm>
+          <a:prstGeom prst="rect">
+            <a:avLst/>
+          </a:prstGeom>
+        </p:spPr>
+        <p:txBody>
+          <a:bodyPr anchorCtr="0" anchor="t" bIns="91425" lIns="91425" spcFirstLastPara="1" rIns="91425" wrap="square" tIns="91425">
+            <a:normAutofit/>
+          </a:bodyPr>
+          <a:lstStyle/>
+          <a:p>
+            <a:pPr indent="0" lvl="0" marL="0" rtl="0" algn="l">
+              <a:lnSpc>
+                <a:spcPct val="100000"/>
+              </a:lnSpc>
+              <a:spcBef>
+                <a:spcPts val="0"/>
+              </a:spcBef>
+              <a:spcAft>
+                <a:spcPts val="0"/>
+              </a:spcAft>
+              <a:buNone/>
+            </a:pPr>
+            <a:r>
+              <a:rPr lang="ja" sz="1200" u="sng"/>
+              <a:t>Evaluating Large Language Models with Runtime Behavior of Program Execution プログラム実行のランタイム動作で大規模言語モデルを評価する</a:t>
+            </a:r>
+            <a:r>
+              <a:rPr lang="ja" sz="1200" u="sng"/>
+              <a:t> 2024</a:t>
+            </a:r>
+            <a:endParaRPr sz="1100"/>
+          </a:p>
+          <a:p>
+            <a:pPr indent="0" lvl="0" marL="0" rtl="0" algn="l">
+              <a:lnSpc>
+                <a:spcPct val="100000"/>
+              </a:lnSpc>
+              <a:spcBef>
+                <a:spcPts val="1200"/>
+              </a:spcBef>
+              <a:spcAft>
+                <a:spcPts val="0"/>
+              </a:spcAft>
+              <a:buNone/>
+            </a:pPr>
+            <a:r>
+              <a:rPr lang="ja" sz="1100" u="sng"/>
+              <a:t>概要</a:t>
+            </a:r>
+            <a:endParaRPr sz="764"/>
+          </a:p>
+          <a:p>
+            <a:pPr indent="0" lvl="0" marL="0" rtl="0" algn="l">
+              <a:lnSpc>
+                <a:spcPct val="100000"/>
+              </a:lnSpc>
+              <a:spcBef>
+                <a:spcPts val="1200"/>
+              </a:spcBef>
+              <a:spcAft>
+                <a:spcPts val="0"/>
+              </a:spcAft>
+              <a:buNone/>
+            </a:pPr>
+            <a:r>
+              <a:rPr lang="ja" sz="764"/>
+              <a:t>コードLLMsの理解能力と生成能力を評価するために、コード推論の能力とコードLLMsの一貫性を評価するためのフレームワークであるREvalが提案。特に、プログラムがどの行を実行するか、変数（プログラムが使用するデータ）の値がどう変わるか、プログラムの出力は何かを予測することに焦点を当てる。</a:t>
+            </a:r>
+            <a:br>
+              <a:rPr lang="ja" sz="764"/>
+            </a:br>
+            <a:r>
+              <a:rPr lang="ja" sz="764"/>
+              <a:t>LLMは、ランタイム動作推論（平均精度44.4％）および増分一貫性評価（平均ICスコア10.3）の両方で不十分なパフォーマンスを示した。</a:t>
+            </a:r>
+            <a:endParaRPr sz="764"/>
+          </a:p>
+          <a:p>
+            <a:pPr indent="0" lvl="0" marL="0" rtl="0" algn="l">
+              <a:lnSpc>
+                <a:spcPct val="100000"/>
+              </a:lnSpc>
+              <a:spcBef>
+                <a:spcPts val="1200"/>
+              </a:spcBef>
+              <a:spcAft>
+                <a:spcPts val="0"/>
+              </a:spcAft>
+              <a:buNone/>
+            </a:pPr>
+            <a:r>
+              <a:rPr lang="ja" sz="1100" u="sng"/>
+              <a:t>手法</a:t>
+            </a:r>
+            <a:endParaRPr sz="800"/>
+          </a:p>
+          <a:p>
+            <a:pPr indent="0" lvl="0" marL="0" rtl="0" algn="l">
+              <a:lnSpc>
+                <a:spcPct val="100000"/>
+              </a:lnSpc>
+              <a:spcBef>
+                <a:spcPts val="1200"/>
+              </a:spcBef>
+              <a:spcAft>
+                <a:spcPts val="0"/>
+              </a:spcAft>
+              <a:buNone/>
+            </a:pPr>
+            <a:r>
+              <a:rPr lang="ja" sz="764"/>
+              <a:t>コードカバレッジ予測（CCP）:「この行は実行されますか？」と問う。プログラムの特定の行が、与えられた入力で実行されるかどうかを予測する。</a:t>
+            </a:r>
+            <a:endParaRPr sz="764"/>
+          </a:p>
+          <a:p>
+            <a:pPr indent="0" lvl="0" marL="0" rtl="0" algn="l">
+              <a:lnSpc>
+                <a:spcPct val="100000"/>
+              </a:lnSpc>
+              <a:spcBef>
+                <a:spcPts val="1200"/>
+              </a:spcBef>
+              <a:spcAft>
+                <a:spcPts val="0"/>
+              </a:spcAft>
+              <a:buNone/>
+            </a:pPr>
+            <a:r>
+              <a:rPr lang="ja" sz="764"/>
+              <a:t>プログラム状態予測（PSP）:「変数の値は何ですか？」と問う。プログラムがある行を実行した後、特定の変数の値と型を予測する。</a:t>
+            </a:r>
+            <a:endParaRPr sz="764"/>
+          </a:p>
+          <a:p>
+            <a:pPr indent="0" lvl="0" marL="0" rtl="0" algn="l">
+              <a:lnSpc>
+                <a:spcPct val="100000"/>
+              </a:lnSpc>
+              <a:spcBef>
+                <a:spcPts val="1200"/>
+              </a:spcBef>
+              <a:spcAft>
+                <a:spcPts val="0"/>
+              </a:spcAft>
+              <a:buNone/>
+            </a:pPr>
+            <a:r>
+              <a:rPr lang="ja" sz="764"/>
+              <a:t>実行パス予測（EPP）:「次に実行される行はどれですか？」と問う。プログラムのどの行が次に実行されるかを予測する。</a:t>
+            </a:r>
+            <a:endParaRPr sz="764"/>
+          </a:p>
+          <a:p>
+            <a:pPr indent="0" lvl="0" marL="0" rtl="0" algn="l">
+              <a:lnSpc>
+                <a:spcPct val="100000"/>
+              </a:lnSpc>
+              <a:spcBef>
+                <a:spcPts val="1200"/>
+              </a:spcBef>
+              <a:spcAft>
+                <a:spcPts val="0"/>
+              </a:spcAft>
+              <a:buNone/>
+            </a:pPr>
+            <a:r>
+              <a:rPr lang="ja" sz="764"/>
+              <a:t>出力予測（OP）:「プログラムの出力は何ですか？」と問う。与えられた入力に対するプログラムの出力を予測する。</a:t>
+            </a:r>
+            <a:endParaRPr sz="764"/>
+          </a:p>
+          <a:p>
+            <a:pPr indent="0" lvl="0" marL="0" rtl="0" algn="l">
+              <a:lnSpc>
+                <a:spcPct val="100000"/>
+              </a:lnSpc>
+              <a:spcBef>
+                <a:spcPts val="1200"/>
+              </a:spcBef>
+              <a:spcAft>
+                <a:spcPts val="0"/>
+              </a:spcAft>
+              <a:buNone/>
+            </a:pPr>
+            <a:r>
+              <a:rPr lang="ja" sz="1100" u="sng"/>
+              <a:t>結果</a:t>
+            </a:r>
+            <a:endParaRPr sz="764"/>
+          </a:p>
+          <a:p>
+            <a:pPr indent="0" lvl="0" marL="0" rtl="0" algn="l">
+              <a:lnSpc>
+                <a:spcPct val="100000"/>
+              </a:lnSpc>
+              <a:spcBef>
+                <a:spcPts val="1200"/>
+              </a:spcBef>
+              <a:spcAft>
+                <a:spcPts val="1200"/>
+              </a:spcAft>
+              <a:buNone/>
+            </a:pPr>
+            <a:r>
+              <a:rPr lang="ja" sz="764"/>
+              <a:t>これらの問いに答えるために様々な大規模言語モデルを評価しました。</a:t>
+            </a:r>
+            <a:br>
+              <a:rPr lang="ja" sz="764"/>
+            </a:br>
+            <a:r>
+              <a:rPr lang="ja" sz="764"/>
+              <a:t>その結果、多くのモデルがこれらのタスクで期待されるほどうまく動作しないことがわかりました。</a:t>
+            </a:r>
+            <a:br>
+              <a:rPr lang="ja" sz="764"/>
+            </a:br>
+            <a:r>
+              <a:rPr lang="ja" sz="764"/>
+              <a:t>特に、プログラムのどの行が次に実行されるか（EPP）を予測するタスクが最も難しいとされ、プログラムの出力を予測するタスク（OP）が比較的簡単であることが示されました。</a:t>
+            </a:r>
+            <a:endParaRPr sz="764"/>
+          </a:p>
+        </p:txBody>
+      </p:sp>
+    </p:spTree>
+  </p:cSld>
+  <p:clrMapOvr>
+    <a:masterClrMapping/>
+  </p:clrMapOvr>
+</p:sld>
+</file>
+
+<file path=ppt/slides/slide75.xml><?xml version="1.0" encoding="utf-8"?>
+<p:sld xmlns:a="http://schemas.openxmlformats.org/drawingml/2006/main" xmlns:r="http://schemas.openxmlformats.org/officeDocument/2006/relationships" xmlns:mc="http://schemas.openxmlformats.org/markup-compatibility/2006" xmlns:mv="urn:schemas-microsoft-com:mac:vml" xmlns:p="http://schemas.openxmlformats.org/presentationml/2006/main" xmlns:c="http://schemas.openxmlformats.org/drawingml/2006/chart" xmlns:dgm="http://schemas.openxmlformats.org/drawingml/2006/diagram" xmlns:o="urn:schemas-microsoft-com:office:office" xmlns:v="urn:schemas-microsoft-com:vml" xmlns:pvml="urn:schemas-microsoft-com:office:powerpoint" xmlns:com="http://schemas.openxmlformats.org/drawingml/2006/compatibility" xmlns:p14="http://schemas.microsoft.com/office/powerpoint/2010/main" xmlns:p15="http://schemas.microsoft.com/office/powerpoint/2012/main" xmlns:ahyp="http://schemas.microsoft.com/office/drawing/2018/hyperlinkcolor">
+  <p:cSld>
+    <p:spTree>
+      <p:nvGrpSpPr>
+        <p:cNvPr id="453" name="Shape 453"/>
+        <p:cNvGrpSpPr/>
+        <p:nvPr/>
+      </p:nvGrpSpPr>
+      <p:grpSpPr>
+        <a:xfrm>
+          <a:off x="0" y="0"/>
+          <a:ext cx="0" cy="0"/>
+          <a:chOff x="0" y="0"/>
+          <a:chExt cx="0" cy="0"/>
+        </a:xfrm>
+      </p:grpSpPr>
+      <p:sp>
+        <p:nvSpPr>
+          <p:cNvPr id="454" name="Google Shape;454;p87"/>
+          <p:cNvSpPr txBox="1"/>
+          <p:nvPr>
+            <p:ph idx="1" type="body"/>
+          </p:nvPr>
+        </p:nvSpPr>
+        <p:spPr>
+          <a:xfrm>
+            <a:off x="0" y="0"/>
+            <a:ext cx="9144000" cy="5049600"/>
+          </a:xfrm>
+          <a:prstGeom prst="rect">
+            <a:avLst/>
+          </a:prstGeom>
+        </p:spPr>
+        <p:txBody>
+          <a:bodyPr anchorCtr="0" anchor="t" bIns="91425" lIns="91425" spcFirstLastPara="1" rIns="91425" wrap="square" tIns="91425">
+            <a:normAutofit/>
+          </a:bodyPr>
+          <a:lstStyle/>
+          <a:p>
+            <a:pPr indent="0" lvl="0" marL="0" rtl="0" algn="l">
+              <a:lnSpc>
+                <a:spcPct val="100000"/>
+              </a:lnSpc>
+              <a:spcBef>
+                <a:spcPts val="0"/>
+              </a:spcBef>
+              <a:spcAft>
+                <a:spcPts val="0"/>
+              </a:spcAft>
+              <a:buNone/>
+            </a:pPr>
+            <a:r>
+              <a:rPr lang="ja" sz="1200" u="sng"/>
+              <a:t>AIOS: LLM Agent Operating System AIOS: LLMエージェントオペレーティングシステム</a:t>
+            </a:r>
+            <a:r>
+              <a:rPr lang="ja" sz="1200" u="sng"/>
+              <a:t> 2024</a:t>
+            </a:r>
+            <a:endParaRPr sz="1100"/>
+          </a:p>
+          <a:p>
+            <a:pPr indent="0" lvl="0" marL="0" rtl="0" algn="l">
+              <a:lnSpc>
+                <a:spcPct val="100000"/>
+              </a:lnSpc>
+              <a:spcBef>
+                <a:spcPts val="1200"/>
+              </a:spcBef>
+              <a:spcAft>
+                <a:spcPts val="0"/>
+              </a:spcAft>
+              <a:buNone/>
+            </a:pPr>
+            <a:r>
+              <a:rPr lang="ja" sz="1100" u="sng"/>
+              <a:t>概要</a:t>
+            </a:r>
+            <a:endParaRPr sz="764"/>
+          </a:p>
+          <a:p>
+            <a:pPr indent="0" lvl="0" marL="0" rtl="0" algn="l">
+              <a:lnSpc>
+                <a:spcPct val="100000"/>
+              </a:lnSpc>
+              <a:spcBef>
+                <a:spcPts val="1200"/>
+              </a:spcBef>
+              <a:spcAft>
+                <a:spcPts val="0"/>
+              </a:spcAft>
+              <a:buNone/>
+            </a:pPr>
+            <a:r>
+              <a:rPr lang="ja" sz="764"/>
+              <a:t>LLMを使用して作られたエージェント同士を管理するAIOSというシステムを提案。AIOSを使用することで、たとえば旅行の計画を立てるエージェントがいるとき、</a:t>
+            </a:r>
+            <a:br>
+              <a:rPr lang="ja" sz="764"/>
+            </a:br>
+            <a:r>
+              <a:rPr lang="ja" sz="764"/>
+              <a:t>このエージェントは、フライトを予約したり、ホテルを見つけたり、支払いを処理したりするために、LLMとOS（オペレーティングシステム）の両方の力を使用することでエージェントのパフォーマンスと効率を向上させることができます。</a:t>
+            </a:r>
+            <a:br>
+              <a:rPr lang="ja" sz="764"/>
+            </a:br>
+            <a:r>
+              <a:rPr lang="ja" sz="764"/>
+              <a:t>https://github.com/agiresearch/AIOS </a:t>
+            </a:r>
+            <a:endParaRPr sz="764"/>
+          </a:p>
+          <a:p>
+            <a:pPr indent="0" lvl="0" marL="0" rtl="0" algn="l">
+              <a:lnSpc>
+                <a:spcPct val="100000"/>
+              </a:lnSpc>
+              <a:spcBef>
+                <a:spcPts val="1200"/>
+              </a:spcBef>
+              <a:spcAft>
+                <a:spcPts val="0"/>
+              </a:spcAft>
+              <a:buNone/>
+            </a:pPr>
+            <a:r>
+              <a:rPr lang="ja" sz="1100" u="sng"/>
+              <a:t>手法</a:t>
+            </a:r>
+            <a:endParaRPr sz="800"/>
+          </a:p>
+          <a:p>
+            <a:pPr indent="0" lvl="0" marL="0" rtl="0" algn="l">
+              <a:lnSpc>
+                <a:spcPct val="100000"/>
+              </a:lnSpc>
+              <a:spcBef>
+                <a:spcPts val="1200"/>
+              </a:spcBef>
+              <a:spcAft>
+                <a:spcPts val="0"/>
+              </a:spcAft>
+              <a:buNone/>
+            </a:pPr>
+            <a:r>
+              <a:rPr lang="ja" sz="764"/>
+              <a:t>AIOSはいくつかの部分で構成されています。主なものを説明します。</a:t>
+            </a:r>
+            <a:br>
+              <a:rPr lang="ja" sz="764"/>
+            </a:br>
+            <a:r>
+              <a:rPr lang="ja" sz="764"/>
+              <a:t>1. エージェントスケジューラー: エージェントが仕事をする順番を決めます。同時に複数のエージェントが働けるようにして、待ち時間を減らします。</a:t>
+            </a:r>
+            <a:br>
+              <a:rPr lang="ja" sz="764"/>
+            </a:br>
+            <a:r>
+              <a:rPr lang="ja" sz="764"/>
+              <a:t>2. コンテキストマネージャー: エージェントが中断されたとき、どこまで仕事を進めたかを記録して、再開したときに同じ場所から続けられるようにします。</a:t>
+            </a:r>
+            <a:br>
+              <a:rPr lang="ja" sz="764"/>
+            </a:br>
+            <a:r>
+              <a:rPr lang="ja" sz="764"/>
+              <a:t>3. メモリマネージャー: エージェントが使う一時的な情報を保管します。エージェントが動いている間だけ情報を保存します。</a:t>
+            </a:r>
+            <a:br>
+              <a:rPr lang="ja" sz="764"/>
+            </a:br>
+            <a:r>
+              <a:rPr lang="ja" sz="764"/>
+              <a:t>4. ストレージマネージャー: 長期間保管する情報を管理します。例えば、ユーザーの好みなどです。</a:t>
+            </a:r>
+            <a:br>
+              <a:rPr lang="ja" sz="764"/>
+            </a:br>
+            <a:r>
+              <a:rPr lang="ja" sz="764"/>
+              <a:t>5. ツールマネージャー: エージェントが外部のツールやサービスを使えるようにします。</a:t>
+            </a:r>
+            <a:br>
+              <a:rPr lang="ja" sz="764"/>
+            </a:br>
+            <a:r>
+              <a:rPr lang="ja" sz="764"/>
+              <a:t>6. アクセスマネージャー: エージェント間の安全な情報のやり取りを保証します。</a:t>
+            </a:r>
+            <a:endParaRPr sz="764"/>
+          </a:p>
+          <a:p>
+            <a:pPr indent="0" lvl="0" marL="0" rtl="0" algn="l">
+              <a:lnSpc>
+                <a:spcPct val="100000"/>
+              </a:lnSpc>
+              <a:spcBef>
+                <a:spcPts val="1200"/>
+              </a:spcBef>
+              <a:spcAft>
+                <a:spcPts val="0"/>
+              </a:spcAft>
+              <a:buNone/>
+            </a:pPr>
+            <a:r>
+              <a:rPr lang="ja" sz="1100" u="sng"/>
+              <a:t>結果</a:t>
+            </a:r>
+            <a:endParaRPr sz="764"/>
+          </a:p>
+          <a:p>
+            <a:pPr indent="0" lvl="0" marL="0" rtl="0" algn="l">
+              <a:lnSpc>
+                <a:spcPct val="100000"/>
+              </a:lnSpc>
+              <a:spcBef>
+                <a:spcPts val="1200"/>
+              </a:spcBef>
+              <a:spcAft>
+                <a:spcPts val="0"/>
+              </a:spcAft>
+              <a:buNone/>
+            </a:pPr>
+            <a:r>
+              <a:rPr lang="ja" sz="764"/>
+              <a:t>AIOSの性能をテストするために、数学の問題を解くエージェント、物語を作るエージェント、レストランを推薦するエージェントを使った実験を行いました。これらのエージェントをAIOSなしで動かすと、後に動くエージェントほど待ち時間が長くなります。しかし、AIOSを使うと、どのエージェントも公平に、効率的にタスクをこなせるようになりました。</a:t>
+            </a:r>
+            <a:endParaRPr sz="764"/>
+          </a:p>
+          <a:p>
+            <a:pPr indent="0" lvl="0" marL="0" rtl="0" algn="l">
+              <a:lnSpc>
+                <a:spcPct val="100000"/>
+              </a:lnSpc>
+              <a:spcBef>
+                <a:spcPts val="1200"/>
+              </a:spcBef>
+              <a:spcAft>
+                <a:spcPts val="1200"/>
+              </a:spcAft>
+              <a:buNone/>
+            </a:pPr>
+            <a:r>
+              <a:rPr lang="ja" sz="764"/>
+              <a:t>AIOSがあると、多くのエージェントが同時に働いても、すべてのエージェントがスムーズにタスクを完了できるらしい</a:t>
+            </a:r>
+            <a:endParaRPr sz="764"/>
+          </a:p>
+        </p:txBody>
+      </p:sp>
+    </p:spTree>
+  </p:cSld>
+  <p:clrMapOvr>
+    <a:masterClrMapping/>
+  </p:clrMapOvr>
+</p:sld>
+</file>
+
+<file path=ppt/slides/slide76.xml><?xml version="1.0" encoding="utf-8"?>
+<p:sld xmlns:a="http://schemas.openxmlformats.org/drawingml/2006/main" xmlns:r="http://schemas.openxmlformats.org/officeDocument/2006/relationships" xmlns:mc="http://schemas.openxmlformats.org/markup-compatibility/2006" xmlns:mv="urn:schemas-microsoft-com:mac:vml" xmlns:p="http://schemas.openxmlformats.org/presentationml/2006/main" xmlns:c="http://schemas.openxmlformats.org/drawingml/2006/chart" xmlns:dgm="http://schemas.openxmlformats.org/drawingml/2006/diagram" xmlns:o="urn:schemas-microsoft-com:office:office" xmlns:v="urn:schemas-microsoft-com:vml" xmlns:pvml="urn:schemas-microsoft-com:office:powerpoint" xmlns:com="http://schemas.openxmlformats.org/drawingml/2006/compatibility" xmlns:p14="http://schemas.microsoft.com/office/powerpoint/2010/main" xmlns:p15="http://schemas.microsoft.com/office/powerpoint/2012/main" xmlns:ahyp="http://schemas.microsoft.com/office/drawing/2018/hyperlinkcolor">
+  <p:cSld>
+    <p:spTree>
+      <p:nvGrpSpPr>
+        <p:cNvPr id="458" name="Shape 458"/>
+        <p:cNvGrpSpPr/>
+        <p:nvPr/>
+      </p:nvGrpSpPr>
+      <p:grpSpPr>
+        <a:xfrm>
+          <a:off x="0" y="0"/>
+          <a:ext cx="0" cy="0"/>
+          <a:chOff x="0" y="0"/>
+          <a:chExt cx="0" cy="0"/>
+        </a:xfrm>
+      </p:grpSpPr>
+      <p:sp>
+        <p:nvSpPr>
+          <p:cNvPr id="459" name="Google Shape;459;p88"/>
+          <p:cNvSpPr txBox="1"/>
+          <p:nvPr>
+            <p:ph idx="1" type="body"/>
+          </p:nvPr>
+        </p:nvSpPr>
+        <p:spPr>
+          <a:xfrm>
+            <a:off x="0" y="0"/>
+            <a:ext cx="9144000" cy="5049600"/>
+          </a:xfrm>
+          <a:prstGeom prst="rect">
+            <a:avLst/>
+          </a:prstGeom>
+        </p:spPr>
+        <p:txBody>
+          <a:bodyPr anchorCtr="0" anchor="t" bIns="91425" lIns="91425" spcFirstLastPara="1" rIns="91425" wrap="square" tIns="91425">
+            <a:normAutofit/>
+          </a:bodyPr>
+          <a:lstStyle/>
+          <a:p>
+            <a:pPr indent="0" lvl="0" marL="0" rtl="0" algn="l">
+              <a:lnSpc>
+                <a:spcPct val="100000"/>
+              </a:lnSpc>
+              <a:spcBef>
+                <a:spcPts val="0"/>
+              </a:spcBef>
+              <a:spcAft>
+                <a:spcPts val="0"/>
+              </a:spcAft>
+              <a:buNone/>
+            </a:pPr>
+            <a:r>
+              <a:rPr lang="ja" sz="1200" u="sng"/>
+              <a:t>Naive Bayes-based Context Extension for Large Language Models</a:t>
+            </a:r>
+            <a:r>
+              <a:rPr lang="ja" sz="1200" u="sng"/>
+              <a:t> 2024</a:t>
+            </a:r>
+            <a:endParaRPr sz="1100"/>
+          </a:p>
+          <a:p>
+            <a:pPr indent="0" lvl="0" marL="0" rtl="0" algn="l">
+              <a:lnSpc>
+                <a:spcPct val="100000"/>
+              </a:lnSpc>
+              <a:spcBef>
+                <a:spcPts val="1200"/>
+              </a:spcBef>
+              <a:spcAft>
+                <a:spcPts val="0"/>
+              </a:spcAft>
+              <a:buNone/>
+            </a:pPr>
+            <a:r>
+              <a:rPr lang="ja" sz="1100" u="sng"/>
+              <a:t>概要</a:t>
+            </a:r>
+            <a:endParaRPr sz="764"/>
+          </a:p>
+          <a:p>
+            <a:pPr indent="0" lvl="0" marL="0" rtl="0" algn="l">
+              <a:lnSpc>
+                <a:spcPct val="100000"/>
+              </a:lnSpc>
+              <a:spcBef>
+                <a:spcPts val="1200"/>
+              </a:spcBef>
+              <a:spcAft>
+                <a:spcPts val="0"/>
+              </a:spcAft>
+              <a:buNone/>
+            </a:pPr>
+            <a:r>
+              <a:rPr lang="ja" sz="764"/>
+              <a:t>Naive Bayes-based Context Extension（NBCE）を使用することでたくさんの情報（たくさんの例文）を使用し回答を作成できるようになります。これによりIn-Context Learning（ICL）を拡張できます。</a:t>
+            </a:r>
+            <a:br>
+              <a:rPr lang="ja" sz="764"/>
+            </a:br>
+            <a:r>
+              <a:rPr lang="ja" sz="764"/>
+              <a:t>https://github.com/amurtadha/NBCE-master</a:t>
+            </a:r>
+            <a:endParaRPr sz="764"/>
+          </a:p>
+          <a:p>
+            <a:pPr indent="0" lvl="0" marL="0" rtl="0" algn="l">
+              <a:lnSpc>
+                <a:spcPct val="100000"/>
+              </a:lnSpc>
+              <a:spcBef>
+                <a:spcPts val="1200"/>
+              </a:spcBef>
+              <a:spcAft>
+                <a:spcPts val="0"/>
+              </a:spcAft>
+              <a:buNone/>
+            </a:pPr>
+            <a:r>
+              <a:rPr lang="ja" sz="1100" u="sng"/>
+              <a:t>手法</a:t>
+            </a:r>
+            <a:endParaRPr sz="800"/>
+          </a:p>
+          <a:p>
+            <a:pPr indent="0" lvl="0" marL="0" rtl="0" algn="l">
+              <a:lnSpc>
+                <a:spcPct val="100000"/>
+              </a:lnSpc>
+              <a:spcBef>
+                <a:spcPts val="1200"/>
+              </a:spcBef>
+              <a:spcAft>
+                <a:spcPts val="0"/>
+              </a:spcAft>
+              <a:buNone/>
+            </a:pPr>
+            <a:r>
+              <a:rPr lang="ja" sz="764"/>
+              <a:t>1. </a:t>
+            </a:r>
+            <a:r>
+              <a:rPr lang="ja" sz="764"/>
+              <a:t>文脈を分割する：まず、AIが学習するための情報（文脈）を小さな部分（ウィンドウ）に分けます。</a:t>
+            </a:r>
+            <a:br>
+              <a:rPr lang="ja" sz="764"/>
+            </a:br>
+            <a:r>
+              <a:rPr lang="ja" sz="764"/>
+              <a:t>2. 投票メカニズム：各ウィンドウを個別に学習し、どのウィンドウが最も重要かを「投票」で決めます。</a:t>
+            </a:r>
+            <a:br>
+              <a:rPr lang="ja" sz="764"/>
+            </a:br>
+            <a:r>
+              <a:rPr lang="ja" sz="764"/>
+              <a:t>3. ナイーブベイズの使用：最後に、ナイーブベイズを使って、これらのウィンドウから最も役立つ情報を選び出し、新しいタスクや質問に対する答えを生成します。</a:t>
+            </a:r>
+            <a:br>
+              <a:rPr lang="ja" sz="764"/>
+            </a:br>
+            <a:endParaRPr sz="764"/>
+          </a:p>
+          <a:p>
+            <a:pPr indent="0" lvl="0" marL="0" rtl="0" algn="l">
+              <a:lnSpc>
+                <a:spcPct val="100000"/>
+              </a:lnSpc>
+              <a:spcBef>
+                <a:spcPts val="1200"/>
+              </a:spcBef>
+              <a:spcAft>
+                <a:spcPts val="0"/>
+              </a:spcAft>
+              <a:buNone/>
+            </a:pPr>
+            <a:r>
+              <a:rPr lang="ja" sz="1100" u="sng"/>
+              <a:t>結果</a:t>
+            </a:r>
+            <a:endParaRPr sz="764"/>
+          </a:p>
+          <a:p>
+            <a:pPr indent="0" lvl="0" marL="0" rtl="0" algn="l">
+              <a:lnSpc>
+                <a:spcPct val="100000"/>
+              </a:lnSpc>
+              <a:spcBef>
+                <a:spcPts val="1200"/>
+              </a:spcBef>
+              <a:spcAft>
+                <a:spcPts val="1200"/>
+              </a:spcAft>
+              <a:buNone/>
+            </a:pPr>
+            <a:r>
+              <a:rPr lang="ja" sz="764"/>
+              <a:t>使用する情報を上手く整理し、有効な情報を選び出すことで、多くのことを学べるようします。</a:t>
+            </a:r>
+            <a:endParaRPr sz="764"/>
+          </a:p>
+        </p:txBody>
+      </p:sp>
+    </p:spTree>
+  </p:cSld>
+  <p:clrMapOvr>
+    <a:masterClrMapping/>
+  </p:clrMapOvr>
+</p:sld>
+</file>
+
+<file path=ppt/slides/slide77.xml><?xml version="1.0" encoding="utf-8"?>
+<p:sld xmlns:a="http://schemas.openxmlformats.org/drawingml/2006/main" xmlns:r="http://schemas.openxmlformats.org/officeDocument/2006/relationships" xmlns:mc="http://schemas.openxmlformats.org/markup-compatibility/2006" xmlns:mv="urn:schemas-microsoft-com:mac:vml" xmlns:p="http://schemas.openxmlformats.org/presentationml/2006/main" xmlns:c="http://schemas.openxmlformats.org/drawingml/2006/chart" xmlns:dgm="http://schemas.openxmlformats.org/drawingml/2006/diagram" xmlns:o="urn:schemas-microsoft-com:office:office" xmlns:v="urn:schemas-microsoft-com:vml" xmlns:pvml="urn:schemas-microsoft-com:office:powerpoint" xmlns:com="http://schemas.openxmlformats.org/drawingml/2006/compatibility" xmlns:p14="http://schemas.microsoft.com/office/powerpoint/2010/main" xmlns:p15="http://schemas.microsoft.com/office/powerpoint/2012/main" xmlns:ahyp="http://schemas.microsoft.com/office/drawing/2018/hyperlinkcolor">
+  <p:cSld>
+    <p:spTree>
+      <p:nvGrpSpPr>
+        <p:cNvPr id="463" name="Shape 463"/>
+        <p:cNvGrpSpPr/>
+        <p:nvPr/>
+      </p:nvGrpSpPr>
+      <p:grpSpPr>
+        <a:xfrm>
+          <a:off x="0" y="0"/>
+          <a:ext cx="0" cy="0"/>
+          <a:chOff x="0" y="0"/>
+          <a:chExt cx="0" cy="0"/>
+        </a:xfrm>
+      </p:grpSpPr>
+      <p:sp>
+        <p:nvSpPr>
+          <p:cNvPr id="464" name="Google Shape;464;p89"/>
+          <p:cNvSpPr txBox="1"/>
+          <p:nvPr>
             <p:ph type="title"/>
           </p:nvPr>
         </p:nvSpPr>
@@ -40146,6 +42530,285 @@
 </file>
 
 <file path=ppt/theme/theme1.xml><?xml version="1.0" encoding="utf-8"?>
+<a:theme xmlns:a="http://schemas.openxmlformats.org/drawingml/2006/main" xmlns:r="http://schemas.openxmlformats.org/officeDocument/2006/relationships" name="Spearmint">
+  <a:themeElements>
+    <a:clrScheme name="Spearmint">
+      <a:dk1>
+        <a:srgbClr val="202729"/>
+      </a:dk1>
+      <a:lt1>
+        <a:srgbClr val="FFFFFF"/>
+      </a:lt1>
+      <a:dk2>
+        <a:srgbClr val="4BA173"/>
+      </a:dk2>
+      <a:lt2>
+        <a:srgbClr val="63D297"/>
+      </a:lt2>
+      <a:accent1>
+        <a:srgbClr val="353744"/>
+      </a:accent1>
+      <a:accent2>
+        <a:srgbClr val="424242"/>
+      </a:accent2>
+      <a:accent3>
+        <a:srgbClr val="616161"/>
+      </a:accent3>
+      <a:accent4>
+        <a:srgbClr val="F0F0F0"/>
+      </a:accent4>
+      <a:accent5>
+        <a:srgbClr val="FF5252"/>
+      </a:accent5>
+      <a:accent6>
+        <a:srgbClr val="FFF176"/>
+      </a:accent6>
+      <a:hlink>
+        <a:srgbClr val="FF5252"/>
+      </a:hlink>
+      <a:folHlink>
+        <a:srgbClr val="FF5252"/>
+      </a:folHlink>
+    </a:clrScheme>
+    <a:fontScheme name="Office">
+      <a:majorFont>
+        <a:latin typeface="Arial"/>
+        <a:ea typeface=""/>
+        <a:cs typeface=""/>
+        <a:font script="Jpan" typeface="ＭＳ Ｐゴシック"/>
+        <a:font script="Hang" typeface="맑은 고딕"/>
+        <a:font script="Hans" typeface="宋体"/>
+        <a:font script="Hant" typeface="新細明體"/>
+        <a:font script="Arab" typeface="Times New Roman"/>
+        <a:font script="Hebr" typeface="Times New Roman"/>
+        <a:font script="Thai" typeface="Angsana New"/>
+        <a:font script="Ethi" typeface="Nyala"/>
+        <a:font script="Beng" typeface="Vrinda"/>
+        <a:font script="Gujr" typeface="Shruti"/>
+        <a:font script="Khmr" typeface="MoolBoran"/>
+        <a:font script="Knda" typeface="Tunga"/>
+        <a:font script="Guru" typeface="Raavi"/>
+        <a:font script="Cans" typeface="Euphemia"/>
+        <a:font script="Cher" typeface="Plantagenet Cherokee"/>
+        <a:font script="Yiii" typeface="Microsoft Yi Baiti"/>
+        <a:font script="Tibt" typeface="Microsoft Himalaya"/>
+        <a:font script="Thaa" typeface="MV Boli"/>
+        <a:font script="Deva" typeface="Mangal"/>
+        <a:font script="Telu" typeface="Gautami"/>
+        <a:font script="Taml" typeface="Latha"/>
+        <a:font script="Syrc" typeface="Estrangelo Edessa"/>
+        <a:font script="Orya" typeface="Kalinga"/>
+        <a:font script="Mlym" typeface="Kartika"/>
+        <a:font script="Laoo" typeface="DokChampa"/>
+        <a:font script="Sinh" typeface="Iskoola Pota"/>
+        <a:font script="Mong" typeface="Mongolian Baiti"/>
+        <a:font script="Viet" typeface="Times New Roman"/>
+        <a:font script="Uigh" typeface="Microsoft Uighur"/>
+        <a:font script="Geor" typeface="Sylfaen"/>
+      </a:majorFont>
+      <a:minorFont>
+        <a:latin typeface="Arial"/>
+        <a:ea typeface=""/>
+        <a:cs typeface=""/>
+        <a:font script="Jpan" typeface="ＭＳ Ｐゴシック"/>
+        <a:font script="Hang" typeface="맑은 고딕"/>
+        <a:font script="Hans" typeface="宋体"/>
+        <a:font script="Hant" typeface="新細明體"/>
+        <a:font script="Arab" typeface="Arial"/>
+        <a:font script="Hebr" typeface="Arial"/>
+        <a:font script="Thai" typeface="Cordia New"/>
+        <a:font script="Ethi" typeface="Nyala"/>
+        <a:font script="Beng" typeface="Vrinda"/>
+        <a:font script="Gujr" typeface="Shruti"/>
+        <a:font script="Khmr" typeface="DaunPenh"/>
+        <a:font script="Knda" typeface="Tunga"/>
+        <a:font script="Guru" typeface="Raavi"/>
+        <a:font script="Cans" typeface="Euphemia"/>
+        <a:font script="Cher" typeface="Plantagenet Cherokee"/>
+        <a:font script="Yiii" typeface="Microsoft Yi Baiti"/>
+        <a:font script="Tibt" typeface="Microsoft Himalaya"/>
+        <a:font script="Thaa" typeface="MV Boli"/>
+        <a:font script="Deva" typeface="Mangal"/>
+        <a:font script="Telu" typeface="Gautami"/>
+        <a:font script="Taml" typeface="Latha"/>
+        <a:font script="Syrc" typeface="Estrangelo Edessa"/>
+        <a:font script="Orya" typeface="Kalinga"/>
+        <a:font script="Mlym" typeface="Kartika"/>
+        <a:font script="Laoo" typeface="DokChampa"/>
+        <a:font script="Sinh" typeface="Iskoola Pota"/>
+        <a:font script="Mong" typeface="Mongolian Baiti"/>
+        <a:font script="Viet" typeface="Arial"/>
+        <a:font script="Uigh" typeface="Microsoft Uighur"/>
+        <a:font script="Geor" typeface="Sylfaen"/>
+      </a:minorFont>
+    </a:fontScheme>
+    <a:fmtScheme name="Office">
+      <a:fillStyleLst>
+        <a:solidFill>
+          <a:schemeClr val="phClr"/>
+        </a:solidFill>
+        <a:gradFill rotWithShape="1">
+          <a:gsLst>
+            <a:gs pos="0">
+              <a:schemeClr val="phClr">
+                <a:tint val="50000"/>
+                <a:satMod val="300000"/>
+              </a:schemeClr>
+            </a:gs>
+            <a:gs pos="35000">
+              <a:schemeClr val="phClr">
+                <a:tint val="37000"/>
+                <a:satMod val="300000"/>
+              </a:schemeClr>
+            </a:gs>
+            <a:gs pos="100000">
+              <a:schemeClr val="phClr">
+                <a:tint val="15000"/>
+                <a:satMod val="350000"/>
+              </a:schemeClr>
+            </a:gs>
+          </a:gsLst>
+          <a:lin ang="16200000" scaled="1"/>
+        </a:gradFill>
+        <a:gradFill rotWithShape="1">
+          <a:gsLst>
+            <a:gs pos="0">
+              <a:schemeClr val="phClr">
+                <a:tint val="100000"/>
+                <a:shade val="100000"/>
+                <a:satMod val="130000"/>
+              </a:schemeClr>
+            </a:gs>
+            <a:gs pos="100000">
+              <a:schemeClr val="phClr">
+                <a:tint val="50000"/>
+                <a:shade val="100000"/>
+                <a:satMod val="350000"/>
+              </a:schemeClr>
+            </a:gs>
+          </a:gsLst>
+          <a:lin ang="16200000" scaled="0"/>
+        </a:gradFill>
+      </a:fillStyleLst>
+      <a:lnStyleLst>
+        <a:ln w="9525" cap="flat" cmpd="sng" algn="ctr">
+          <a:solidFill>
+            <a:schemeClr val="phClr">
+              <a:shade val="95000"/>
+              <a:satMod val="105000"/>
+            </a:schemeClr>
+          </a:solidFill>
+          <a:prstDash val="solid"/>
+        </a:ln>
+        <a:ln w="25400" cap="flat" cmpd="sng" algn="ctr">
+          <a:solidFill>
+            <a:schemeClr val="phClr"/>
+          </a:solidFill>
+          <a:prstDash val="solid"/>
+        </a:ln>
+        <a:ln w="38100" cap="flat" cmpd="sng" algn="ctr">
+          <a:solidFill>
+            <a:schemeClr val="phClr"/>
+          </a:solidFill>
+          <a:prstDash val="solid"/>
+        </a:ln>
+      </a:lnStyleLst>
+      <a:effectStyleLst>
+        <a:effectStyle>
+          <a:effectLst>
+            <a:outerShdw blurRad="40000" dist="20000" dir="5400000" rotWithShape="0">
+              <a:srgbClr val="000000">
+                <a:alpha val="38000"/>
+              </a:srgbClr>
+            </a:outerShdw>
+          </a:effectLst>
+        </a:effectStyle>
+        <a:effectStyle>
+          <a:effectLst>
+            <a:outerShdw blurRad="40000" dist="23000" dir="5400000" rotWithShape="0">
+              <a:srgbClr val="000000">
+                <a:alpha val="35000"/>
+              </a:srgbClr>
+            </a:outerShdw>
+          </a:effectLst>
+        </a:effectStyle>
+        <a:effectStyle>
+          <a:effectLst>
+            <a:outerShdw blurRad="40000" dist="23000" dir="5400000" rotWithShape="0">
+              <a:srgbClr val="000000">
+                <a:alpha val="35000"/>
+              </a:srgbClr>
+            </a:outerShdw>
+          </a:effectLst>
+          <a:scene3d>
+            <a:camera prst="orthographicFront">
+              <a:rot lat="0" lon="0" rev="0"/>
+            </a:camera>
+            <a:lightRig rig="threePt" dir="t">
+              <a:rot lat="0" lon="0" rev="1200000"/>
+            </a:lightRig>
+          </a:scene3d>
+          <a:sp3d>
+            <a:bevelT w="63500" h="25400"/>
+          </a:sp3d>
+        </a:effectStyle>
+      </a:effectStyleLst>
+      <a:bgFillStyleLst>
+        <a:solidFill>
+          <a:schemeClr val="phClr"/>
+        </a:solidFill>
+        <a:gradFill rotWithShape="1">
+          <a:gsLst>
+            <a:gs pos="0">
+              <a:schemeClr val="phClr">
+                <a:tint val="40000"/>
+                <a:satMod val="350000"/>
+              </a:schemeClr>
+            </a:gs>
+            <a:gs pos="40000">
+              <a:schemeClr val="phClr">
+                <a:tint val="45000"/>
+                <a:shade val="99000"/>
+                <a:satMod val="350000"/>
+              </a:schemeClr>
+            </a:gs>
+            <a:gs pos="100000">
+              <a:schemeClr val="phClr">
+                <a:shade val="20000"/>
+                <a:satMod val="255000"/>
+              </a:schemeClr>
+            </a:gs>
+          </a:gsLst>
+          <a:path path="circle">
+            <a:fillToRect l="50000" t="-80000" r="50000" b="180000"/>
+          </a:path>
+        </a:gradFill>
+        <a:gradFill rotWithShape="1">
+          <a:gsLst>
+            <a:gs pos="0">
+              <a:schemeClr val="phClr">
+                <a:tint val="80000"/>
+                <a:satMod val="300000"/>
+              </a:schemeClr>
+            </a:gs>
+            <a:gs pos="100000">
+              <a:schemeClr val="phClr">
+                <a:shade val="30000"/>
+                <a:satMod val="200000"/>
+              </a:schemeClr>
+            </a:gs>
+          </a:gsLst>
+          <a:path path="circle">
+            <a:fillToRect l="50000" t="50000" r="50000" b="50000"/>
+          </a:path>
+        </a:gradFill>
+      </a:bgFillStyleLst>
+    </a:fmtScheme>
+  </a:themeElements>
+</a:theme>
+</file>
+
+<file path=ppt/theme/theme2.xml><?xml version="1.0" encoding="utf-8"?>
 <a:theme xmlns:a="http://schemas.openxmlformats.org/drawingml/2006/main" xmlns:r="http://schemas.openxmlformats.org/officeDocument/2006/relationships">
   <a:themeElements>
     <a:clrScheme name="Default">
@@ -40422,283 +43085,4 @@
     </a:fmtScheme>
   </a:themeElements>
 </a:theme>
-</file>
-
-<file path=ppt/theme/theme2.xml><?xml version="1.0" encoding="utf-8"?>
-<a:theme xmlns:a="http://schemas.openxmlformats.org/drawingml/2006/main" xmlns:r="http://schemas.openxmlformats.org/officeDocument/2006/relationships" name="Spearmint">
-  <a:themeElements>
-    <a:clrScheme name="Spearmint">
-      <a:dk1>
-        <a:srgbClr val="202729"/>
-      </a:dk1>
-      <a:lt1>
-        <a:srgbClr val="FFFFFF"/>
-      </a:lt1>
-      <a:dk2>
-        <a:srgbClr val="4BA173"/>
-      </a:dk2>
-      <a:lt2>
-        <a:srgbClr val="63D297"/>
-      </a:lt2>
-      <a:accent1>
-        <a:srgbClr val="353744"/>
-      </a:accent1>
-      <a:accent2>
-        <a:srgbClr val="424242"/>
-      </a:accent2>
-      <a:accent3>
-        <a:srgbClr val="616161"/>
-      </a:accent3>
-      <a:accent4>
-        <a:srgbClr val="F0F0F0"/>
-      </a:accent4>
-      <a:accent5>
-        <a:srgbClr val="FF5252"/>
-      </a:accent5>
-      <a:accent6>
-        <a:srgbClr val="FFF176"/>
-      </a:accent6>
-      <a:hlink>
-        <a:srgbClr val="FF5252"/>
-      </a:hlink>
-      <a:folHlink>
-        <a:srgbClr val="FF5252"/>
-      </a:folHlink>
-    </a:clrScheme>
-    <a:fontScheme name="Office">
-      <a:majorFont>
-        <a:latin typeface="Arial"/>
-        <a:ea typeface=""/>
-        <a:cs typeface=""/>
-        <a:font script="Jpan" typeface="ＭＳ Ｐゴシック"/>
-        <a:font script="Hang" typeface="맑은 고딕"/>
-        <a:font script="Hans" typeface="宋体"/>
-        <a:font script="Hant" typeface="新細明體"/>
-        <a:font script="Arab" typeface="Times New Roman"/>
-        <a:font script="Hebr" typeface="Times New Roman"/>
-        <a:font script="Thai" typeface="Angsana New"/>
-        <a:font script="Ethi" typeface="Nyala"/>
-        <a:font script="Beng" typeface="Vrinda"/>
-        <a:font script="Gujr" typeface="Shruti"/>
-        <a:font script="Khmr" typeface="MoolBoran"/>
-        <a:font script="Knda" typeface="Tunga"/>
-        <a:font script="Guru" typeface="Raavi"/>
-        <a:font script="Cans" typeface="Euphemia"/>
-        <a:font script="Cher" typeface="Plantagenet Cherokee"/>
-        <a:font script="Yiii" typeface="Microsoft Yi Baiti"/>
-        <a:font script="Tibt" typeface="Microsoft Himalaya"/>
-        <a:font script="Thaa" typeface="MV Boli"/>
-        <a:font script="Deva" typeface="Mangal"/>
-        <a:font script="Telu" typeface="Gautami"/>
-        <a:font script="Taml" typeface="Latha"/>
-        <a:font script="Syrc" typeface="Estrangelo Edessa"/>
-        <a:font script="Orya" typeface="Kalinga"/>
-        <a:font script="Mlym" typeface="Kartika"/>
-        <a:font script="Laoo" typeface="DokChampa"/>
-        <a:font script="Sinh" typeface="Iskoola Pota"/>
-        <a:font script="Mong" typeface="Mongolian Baiti"/>
-        <a:font script="Viet" typeface="Times New Roman"/>
-        <a:font script="Uigh" typeface="Microsoft Uighur"/>
-        <a:font script="Geor" typeface="Sylfaen"/>
-      </a:majorFont>
-      <a:minorFont>
-        <a:latin typeface="Arial"/>
-        <a:ea typeface=""/>
-        <a:cs typeface=""/>
-        <a:font script="Jpan" typeface="ＭＳ Ｐゴシック"/>
-        <a:font script="Hang" typeface="맑은 고딕"/>
-        <a:font script="Hans" typeface="宋体"/>
-        <a:font script="Hant" typeface="新細明體"/>
-        <a:font script="Arab" typeface="Arial"/>
-        <a:font script="Hebr" typeface="Arial"/>
-        <a:font script="Thai" typeface="Cordia New"/>
-        <a:font script="Ethi" typeface="Nyala"/>
-        <a:font script="Beng" typeface="Vrinda"/>
-        <a:font script="Gujr" typeface="Shruti"/>
-        <a:font script="Khmr" typeface="DaunPenh"/>
-        <a:font script="Knda" typeface="Tunga"/>
-        <a:font script="Guru" typeface="Raavi"/>
-        <a:font script="Cans" typeface="Euphemia"/>
-        <a:font script="Cher" typeface="Plantagenet Cherokee"/>
-        <a:font script="Yiii" typeface="Microsoft Yi Baiti"/>
-        <a:font script="Tibt" typeface="Microsoft Himalaya"/>
-        <a:font script="Thaa" typeface="MV Boli"/>
-        <a:font script="Deva" typeface="Mangal"/>
-        <a:font script="Telu" typeface="Gautami"/>
-        <a:font script="Taml" typeface="Latha"/>
-        <a:font script="Syrc" typeface="Estrangelo Edessa"/>
-        <a:font script="Orya" typeface="Kalinga"/>
-        <a:font script="Mlym" typeface="Kartika"/>
-        <a:font script="Laoo" typeface="DokChampa"/>
-        <a:font script="Sinh" typeface="Iskoola Pota"/>
-        <a:font script="Mong" typeface="Mongolian Baiti"/>
-        <a:font script="Viet" typeface="Arial"/>
-        <a:font script="Uigh" typeface="Microsoft Uighur"/>
-        <a:font script="Geor" typeface="Sylfaen"/>
-      </a:minorFont>
-    </a:fontScheme>
-    <a:fmtScheme name="Office">
-      <a:fillStyleLst>
-        <a:solidFill>
-          <a:schemeClr val="phClr"/>
-        </a:solidFill>
-        <a:gradFill rotWithShape="1">
-          <a:gsLst>
-            <a:gs pos="0">
-              <a:schemeClr val="phClr">
-                <a:tint val="50000"/>
-                <a:satMod val="300000"/>
-              </a:schemeClr>
-            </a:gs>
-            <a:gs pos="35000">
-              <a:schemeClr val="phClr">
-                <a:tint val="37000"/>
-                <a:satMod val="300000"/>
-              </a:schemeClr>
-            </a:gs>
-            <a:gs pos="100000">
-              <a:schemeClr val="phClr">
-                <a:tint val="15000"/>
-                <a:satMod val="350000"/>
-              </a:schemeClr>
-            </a:gs>
-          </a:gsLst>
-          <a:lin ang="16200000" scaled="1"/>
-        </a:gradFill>
-        <a:gradFill rotWithShape="1">
-          <a:gsLst>
-            <a:gs pos="0">
-              <a:schemeClr val="phClr">
-                <a:tint val="100000"/>
-                <a:shade val="100000"/>
-                <a:satMod val="130000"/>
-              </a:schemeClr>
-            </a:gs>
-            <a:gs pos="100000">
-              <a:schemeClr val="phClr">
-                <a:tint val="50000"/>
-                <a:shade val="100000"/>
-                <a:satMod val="350000"/>
-              </a:schemeClr>
-            </a:gs>
-          </a:gsLst>
-          <a:lin ang="16200000" scaled="0"/>
-        </a:gradFill>
-      </a:fillStyleLst>
-      <a:lnStyleLst>
-        <a:ln w="9525" cap="flat" cmpd="sng" algn="ctr">
-          <a:solidFill>
-            <a:schemeClr val="phClr">
-              <a:shade val="95000"/>
-              <a:satMod val="105000"/>
-            </a:schemeClr>
-          </a:solidFill>
-          <a:prstDash val="solid"/>
-        </a:ln>
-        <a:ln w="25400" cap="flat" cmpd="sng" algn="ctr">
-          <a:solidFill>
-            <a:schemeClr val="phClr"/>
-          </a:solidFill>
-          <a:prstDash val="solid"/>
-        </a:ln>
-        <a:ln w="38100" cap="flat" cmpd="sng" algn="ctr">
-          <a:solidFill>
-            <a:schemeClr val="phClr"/>
-          </a:solidFill>
-          <a:prstDash val="solid"/>
-        </a:ln>
-      </a:lnStyleLst>
-      <a:effectStyleLst>
-        <a:effectStyle>
-          <a:effectLst>
-            <a:outerShdw blurRad="40000" dist="20000" dir="5400000" rotWithShape="0">
-              <a:srgbClr val="000000">
-                <a:alpha val="38000"/>
-              </a:srgbClr>
-            </a:outerShdw>
-          </a:effectLst>
-        </a:effectStyle>
-        <a:effectStyle>
-          <a:effectLst>
-            <a:outerShdw blurRad="40000" dist="23000" dir="5400000" rotWithShape="0">
-              <a:srgbClr val="000000">
-                <a:alpha val="35000"/>
-              </a:srgbClr>
-            </a:outerShdw>
-          </a:effectLst>
-        </a:effectStyle>
-        <a:effectStyle>
-          <a:effectLst>
-            <a:outerShdw blurRad="40000" dist="23000" dir="5400000" rotWithShape="0">
-              <a:srgbClr val="000000">
-                <a:alpha val="35000"/>
-              </a:srgbClr>
-            </a:outerShdw>
-          </a:effectLst>
-          <a:scene3d>
-            <a:camera prst="orthographicFront">
-              <a:rot lat="0" lon="0" rev="0"/>
-            </a:camera>
-            <a:lightRig rig="threePt" dir="t">
-              <a:rot lat="0" lon="0" rev="1200000"/>
-            </a:lightRig>
-          </a:scene3d>
-          <a:sp3d>
-            <a:bevelT w="63500" h="25400"/>
-          </a:sp3d>
-        </a:effectStyle>
-      </a:effectStyleLst>
-      <a:bgFillStyleLst>
-        <a:solidFill>
-          <a:schemeClr val="phClr"/>
-        </a:solidFill>
-        <a:gradFill rotWithShape="1">
-          <a:gsLst>
-            <a:gs pos="0">
-              <a:schemeClr val="phClr">
-                <a:tint val="40000"/>
-                <a:satMod val="350000"/>
-              </a:schemeClr>
-            </a:gs>
-            <a:gs pos="40000">
-              <a:schemeClr val="phClr">
-                <a:tint val="45000"/>
-                <a:shade val="99000"/>
-                <a:satMod val="350000"/>
-              </a:schemeClr>
-            </a:gs>
-            <a:gs pos="100000">
-              <a:schemeClr val="phClr">
-                <a:shade val="20000"/>
-                <a:satMod val="255000"/>
-              </a:schemeClr>
-            </a:gs>
-          </a:gsLst>
-          <a:path path="circle">
-            <a:fillToRect l="50000" t="-80000" r="50000" b="180000"/>
-          </a:path>
-        </a:gradFill>
-        <a:gradFill rotWithShape="1">
-          <a:gsLst>
-            <a:gs pos="0">
-              <a:schemeClr val="phClr">
-                <a:tint val="80000"/>
-                <a:satMod val="300000"/>
-              </a:schemeClr>
-            </a:gs>
-            <a:gs pos="100000">
-              <a:schemeClr val="phClr">
-                <a:shade val="30000"/>
-                <a:satMod val="200000"/>
-              </a:schemeClr>
-            </a:gs>
-          </a:gsLst>
-          <a:path path="circle">
-            <a:fillToRect l="50000" t="50000" r="50000" b="50000"/>
-          </a:path>
-        </a:gradFill>
-      </a:bgFillStyleLst>
-    </a:fmtScheme>
-  </a:themeElements>
-</a:theme>
 </file>
</xml_diff>